<commit_message>
trying to get xamarin working:
</commit_message>
<xml_diff>
--- a/Planning/Timekeeper.pptx
+++ b/Planning/Timekeeper.pptx
@@ -11,8 +11,9 @@
     <p:sldId id="258" r:id="rId5"/>
     <p:sldId id="262" r:id="rId6"/>
     <p:sldId id="259" r:id="rId7"/>
-    <p:sldId id="260" r:id="rId8"/>
-    <p:sldId id="261" r:id="rId9"/>
+    <p:sldId id="264" r:id="rId8"/>
+    <p:sldId id="260" r:id="rId9"/>
+    <p:sldId id="261" r:id="rId10"/>
   </p:sldIdLst>
   <p:sldSz cx="12192000" cy="6858000"/>
   <p:notesSz cx="6858000" cy="9144000"/>
@@ -344,7 +345,7 @@
             <a:fld id="{5586B75A-687E-405C-8A0B-8D00578BA2C3}" type="datetimeFigureOut">
               <a:rPr lang="en-US" dirty="0"/>
               <a:pPr/>
-              <a:t>2/28/2017</a:t>
+              <a:t>3/4/2017</a:t>
             </a:fld>
             <a:endParaRPr lang="en-US" dirty="0"/>
           </a:p>
@@ -511,7 +512,7 @@
             <a:fld id="{5586B75A-687E-405C-8A0B-8D00578BA2C3}" type="datetimeFigureOut">
               <a:rPr lang="en-US" dirty="0"/>
               <a:pPr/>
-              <a:t>2/28/2017</a:t>
+              <a:t>3/4/2017</a:t>
             </a:fld>
             <a:endParaRPr lang="en-US" dirty="0"/>
           </a:p>
@@ -688,7 +689,7 @@
             <a:fld id="{5586B75A-687E-405C-8A0B-8D00578BA2C3}" type="datetimeFigureOut">
               <a:rPr lang="en-US" dirty="0"/>
               <a:pPr/>
-              <a:t>2/28/2017</a:t>
+              <a:t>3/4/2017</a:t>
             </a:fld>
             <a:endParaRPr lang="en-US" dirty="0"/>
           </a:p>
@@ -855,7 +856,7 @@
             <a:fld id="{5586B75A-687E-405C-8A0B-8D00578BA2C3}" type="datetimeFigureOut">
               <a:rPr lang="en-US" dirty="0"/>
               <a:pPr/>
-              <a:t>2/28/2017</a:t>
+              <a:t>3/4/2017</a:t>
             </a:fld>
             <a:endParaRPr lang="en-US" dirty="0"/>
           </a:p>
@@ -1110,7 +1111,7 @@
             <a:fld id="{5586B75A-687E-405C-8A0B-8D00578BA2C3}" type="datetimeFigureOut">
               <a:rPr lang="en-US" dirty="0"/>
               <a:pPr/>
-              <a:t>2/28/2017</a:t>
+              <a:t>3/4/2017</a:t>
             </a:fld>
             <a:endParaRPr lang="en-US" dirty="0"/>
           </a:p>
@@ -1395,7 +1396,7 @@
             <a:fld id="{5586B75A-687E-405C-8A0B-8D00578BA2C3}" type="datetimeFigureOut">
               <a:rPr lang="en-US" dirty="0"/>
               <a:pPr/>
-              <a:t>2/28/2017</a:t>
+              <a:t>3/4/2017</a:t>
             </a:fld>
             <a:endParaRPr lang="en-US" dirty="0"/>
           </a:p>
@@ -1834,7 +1835,7 @@
             <a:fld id="{5586B75A-687E-405C-8A0B-8D00578BA2C3}" type="datetimeFigureOut">
               <a:rPr lang="en-US" dirty="0"/>
               <a:pPr/>
-              <a:t>2/28/2017</a:t>
+              <a:t>3/4/2017</a:t>
             </a:fld>
             <a:endParaRPr lang="en-US" dirty="0"/>
           </a:p>
@@ -1949,7 +1950,7 @@
             <a:fld id="{5586B75A-687E-405C-8A0B-8D00578BA2C3}" type="datetimeFigureOut">
               <a:rPr lang="en-US" dirty="0"/>
               <a:pPr/>
-              <a:t>2/28/2017</a:t>
+              <a:t>3/4/2017</a:t>
             </a:fld>
             <a:endParaRPr lang="en-US" dirty="0"/>
           </a:p>
@@ -2041,7 +2042,7 @@
             <a:fld id="{5586B75A-687E-405C-8A0B-8D00578BA2C3}" type="datetimeFigureOut">
               <a:rPr lang="en-US" dirty="0"/>
               <a:pPr/>
-              <a:t>2/28/2017</a:t>
+              <a:t>3/4/2017</a:t>
             </a:fld>
             <a:endParaRPr lang="en-US" dirty="0"/>
           </a:p>
@@ -2326,7 +2327,7 @@
             <a:fld id="{5586B75A-687E-405C-8A0B-8D00578BA2C3}" type="datetimeFigureOut">
               <a:rPr lang="en-US" dirty="0"/>
               <a:pPr/>
-              <a:t>2/28/2017</a:t>
+              <a:t>3/4/2017</a:t>
             </a:fld>
             <a:endParaRPr lang="en-US" dirty="0"/>
           </a:p>
@@ -2596,7 +2597,7 @@
             <a:fld id="{5586B75A-687E-405C-8A0B-8D00578BA2C3}" type="datetimeFigureOut">
               <a:rPr lang="en-US" dirty="0"/>
               <a:pPr/>
-              <a:t>2/28/2017</a:t>
+              <a:t>3/4/2017</a:t>
             </a:fld>
             <a:endParaRPr lang="en-US" dirty="0"/>
           </a:p>
@@ -2890,7 +2891,7 @@
             <a:fld id="{5586B75A-687E-405C-8A0B-8D00578BA2C3}" type="datetimeFigureOut">
               <a:rPr lang="en-US" dirty="0"/>
               <a:pPr/>
-              <a:t>2/28/2017</a:t>
+              <a:t>3/4/2017</a:t>
             </a:fld>
             <a:endParaRPr lang="en-US" dirty="0"/>
           </a:p>
@@ -3700,7 +3701,6 @@
               <a:rPr lang="en-NZ" dirty="0" smtClean="0"/>
               <a:t> apps)</a:t>
             </a:r>
-            <a:endParaRPr lang="en-NZ" dirty="0" smtClean="0"/>
           </a:p>
           <a:p>
             <a:pPr marL="502920" lvl="1" indent="0">
@@ -3916,128 +3916,76 @@
         <p:spPr>
           <a:xfrm>
             <a:off x="3869268" y="864108"/>
-            <a:ext cx="7315200" cy="3853171"/>
+            <a:ext cx="7315200" cy="4571017"/>
           </a:xfrm>
         </p:spPr>
         <p:txBody>
-          <a:bodyPr/>
-          <a:lstStyle/>
-          <a:p>
-            <a:r>
-              <a:rPr lang="en-NZ" dirty="0" smtClean="0"/>
-              <a:t>Students </a:t>
-            </a:r>
-            <a:r>
-              <a:rPr lang="en-NZ" dirty="0"/>
-              <a:t>are spending large amounts of time on their computers</a:t>
-            </a:r>
-          </a:p>
-          <a:p>
-            <a:r>
-              <a:rPr lang="en-NZ" dirty="0"/>
-              <a:t>Are finding themselves unproductive and wasting time</a:t>
-            </a:r>
-          </a:p>
-          <a:p>
-            <a:r>
-              <a:rPr lang="en-NZ" dirty="0" smtClean="0"/>
-              <a:t>Want to know how to </a:t>
-            </a:r>
-            <a:r>
-              <a:rPr lang="en-NZ" dirty="0"/>
-              <a:t>improve their efficiency</a:t>
-            </a:r>
-          </a:p>
-          <a:p>
-            <a:r>
-              <a:rPr lang="en-NZ" dirty="0"/>
-              <a:t>Want to know where all their time is going</a:t>
-            </a:r>
-          </a:p>
-        </p:txBody>
-      </p:sp>
-      <p:pic>
-        <p:nvPicPr>
-          <p:cNvPr id="1026" name="Picture 2" descr="Clock, Day, Hour, Measure, Minute, Time, Watch"/>
-          <p:cNvPicPr>
-            <a:picLocks noChangeAspect="1" noChangeArrowheads="1"/>
-          </p:cNvPicPr>
-          <p:nvPr/>
-        </p:nvPicPr>
-        <p:blipFill>
-          <a:blip r:embed="rId2">
-            <a:extLst>
-              <a:ext uri="{28A0092B-C50C-407E-A947-70E740481C1C}">
-                <a14:useLocalDpi xmlns:a14="http://schemas.microsoft.com/office/drawing/2010/main" val="0"/>
-              </a:ext>
-            </a:extLst>
-          </a:blip>
-          <a:srcRect/>
-          <a:stretch>
-            <a:fillRect/>
-          </a:stretch>
-        </p:blipFill>
-        <p:spPr bwMode="auto">
-          <a:xfrm>
-            <a:off x="4949766" y="3894068"/>
-            <a:ext cx="2224720" cy="2224721"/>
-          </a:xfrm>
-          <a:prstGeom prst="rect">
-            <a:avLst/>
-          </a:prstGeom>
-          <a:noFill/>
-          <a:extLst>
-            <a:ext uri="{909E8E84-426E-40DD-AFC4-6F175D3DCCD1}">
-              <a14:hiddenFill xmlns:a14="http://schemas.microsoft.com/office/drawing/2010/main">
-                <a:solidFill>
-                  <a:srgbClr val="FFFFFF"/>
-                </a:solidFill>
-              </a14:hiddenFill>
-            </a:ext>
-          </a:extLst>
-        </p:spPr>
-      </p:pic>
-      <p:pic>
-        <p:nvPicPr>
-          <p:cNvPr id="1030" name="Picture 6" descr="https://upload.wikimedia.org/wikipedia/commons/thumb/5/55/Question_Mark.svg/2000px-Question_Mark.svg.png"/>
-          <p:cNvPicPr>
-            <a:picLocks noChangeAspect="1" noChangeArrowheads="1"/>
-          </p:cNvPicPr>
-          <p:nvPr/>
-        </p:nvPicPr>
-        <p:blipFill>
-          <a:blip r:embed="rId3">
-            <a:extLst>
-              <a:ext uri="{28A0092B-C50C-407E-A947-70E740481C1C}">
-                <a14:useLocalDpi xmlns:a14="http://schemas.microsoft.com/office/drawing/2010/main" val="0"/>
-              </a:ext>
-            </a:extLst>
-          </a:blip>
-          <a:srcRect/>
-          <a:stretch>
-            <a:fillRect/>
-          </a:stretch>
-        </p:blipFill>
-        <p:spPr bwMode="auto">
-          <a:xfrm>
-            <a:off x="7057384" y="3363457"/>
-            <a:ext cx="4381255" cy="3285941"/>
-          </a:xfrm>
-          <a:prstGeom prst="rect">
-            <a:avLst/>
-          </a:prstGeom>
-          <a:noFill/>
-          <a:extLst>
-            <a:ext uri="{909E8E84-426E-40DD-AFC4-6F175D3DCCD1}">
-              <a14:hiddenFill xmlns:a14="http://schemas.microsoft.com/office/drawing/2010/main">
-                <a:solidFill>
-                  <a:srgbClr val="FFFFFF"/>
-                </a:solidFill>
-              </a14:hiddenFill>
-            </a:ext>
-          </a:extLst>
-        </p:spPr>
-      </p:pic>
+          <a:bodyPr>
+            <a:noAutofit/>
+          </a:bodyPr>
+          <a:lstStyle/>
+          <a:p>
+            <a:r>
+              <a:rPr lang="en-NZ" sz="2400" dirty="0" smtClean="0"/>
+              <a:t>Medium to larg</a:t>
+            </a:r>
+            <a:r>
+              <a:rPr lang="en-NZ" sz="2400" dirty="0" smtClean="0"/>
+              <a:t>e sized businesses</a:t>
+            </a:r>
+            <a:endParaRPr lang="en-NZ" sz="2400" dirty="0" smtClean="0"/>
+          </a:p>
+          <a:p>
+            <a:r>
+              <a:rPr lang="en-NZ" sz="2400" dirty="0" smtClean="0"/>
+              <a:t>Employees that do most of their work on their computers</a:t>
+            </a:r>
+          </a:p>
+          <a:p>
+            <a:r>
+              <a:rPr lang="en-NZ" sz="2400" dirty="0" smtClean="0"/>
+              <a:t>Data entry, call centres, etc…</a:t>
+            </a:r>
+            <a:endParaRPr lang="en-NZ" sz="2400" dirty="0"/>
+          </a:p>
+          <a:p>
+            <a:endParaRPr lang="en-NZ" sz="2400" dirty="0"/>
+          </a:p>
+          <a:p>
+            <a:r>
+              <a:rPr lang="en-NZ" sz="2400" dirty="0" smtClean="0"/>
+              <a:t>Wasting time at work on social media and videos</a:t>
+            </a:r>
+            <a:endParaRPr lang="en-NZ" sz="2400" dirty="0"/>
+          </a:p>
+          <a:p>
+            <a:r>
+              <a:rPr lang="en-NZ" sz="2400" dirty="0" smtClean="0"/>
+              <a:t>Employers want to know how </a:t>
+            </a:r>
+            <a:r>
+              <a:rPr lang="en-NZ" sz="2400" dirty="0" smtClean="0"/>
+              <a:t>to </a:t>
+            </a:r>
+            <a:r>
+              <a:rPr lang="en-NZ" sz="2400" dirty="0"/>
+              <a:t>improve </a:t>
+            </a:r>
+            <a:r>
+              <a:rPr lang="en-NZ" sz="2400" dirty="0" smtClean="0"/>
+              <a:t>worker efficiency</a:t>
+            </a:r>
+            <a:endParaRPr lang="en-NZ" sz="2400" dirty="0"/>
+          </a:p>
+          <a:p>
+            <a:r>
+              <a:rPr lang="en-NZ" sz="2400" dirty="0" smtClean="0"/>
+              <a:t>Which employees are productive and which aren’t?</a:t>
+            </a:r>
+            <a:endParaRPr lang="en-NZ" sz="2400" dirty="0"/>
+          </a:p>
+        </p:txBody>
+      </p:sp>
     </p:spTree>
     <p:extLst>
       <p:ext uri="{BB962C8B-B14F-4D97-AF65-F5344CB8AC3E}">
@@ -4113,78 +4061,67 @@
           <a:lstStyle/>
           <a:p>
             <a:r>
-              <a:rPr lang="en-NZ" dirty="0" smtClean="0"/>
-              <a:t>Track application </a:t>
-            </a:r>
-            <a:r>
-              <a:rPr lang="en-NZ" dirty="0"/>
+              <a:rPr lang="en-NZ" sz="2400" dirty="0" smtClean="0"/>
+              <a:t>Track </a:t>
+            </a:r>
+            <a:r>
+              <a:rPr lang="en-NZ" sz="2400" dirty="0" smtClean="0"/>
+              <a:t>application and web </a:t>
+            </a:r>
+            <a:r>
+              <a:rPr lang="en-NZ" sz="2400" dirty="0"/>
               <a:t>usage</a:t>
             </a:r>
           </a:p>
           <a:p>
             <a:r>
-              <a:rPr lang="en-NZ" dirty="0"/>
+              <a:rPr lang="en-NZ" sz="2400" dirty="0"/>
               <a:t>Display statistics and graphs </a:t>
             </a:r>
             <a:r>
-              <a:rPr lang="en-NZ" dirty="0" smtClean="0"/>
-              <a:t>for each application each week</a:t>
-            </a:r>
-            <a:endParaRPr lang="en-NZ" dirty="0"/>
-          </a:p>
-          <a:p>
-            <a:r>
-              <a:rPr lang="en-NZ" dirty="0"/>
-              <a:t>Compare the usage to a weekly average </a:t>
-            </a:r>
-            <a:r>
-              <a:rPr lang="en-NZ" dirty="0" smtClean="0"/>
-              <a:t>to track progress</a:t>
-            </a:r>
-            <a:endParaRPr lang="en-NZ" dirty="0"/>
-          </a:p>
-          <a:p>
-            <a:r>
-              <a:rPr lang="en-NZ" dirty="0" smtClean="0"/>
-              <a:t>Targeted towards university students</a:t>
-            </a:r>
-            <a:endParaRPr lang="en-NZ" dirty="0"/>
-          </a:p>
-          <a:p>
-            <a:endParaRPr lang="en-NZ" dirty="0"/>
-          </a:p>
-          <a:p>
-            <a:r>
-              <a:rPr lang="en-NZ" dirty="0"/>
+              <a:rPr lang="en-NZ" sz="2400" dirty="0" smtClean="0"/>
+              <a:t>for each </a:t>
+            </a:r>
+            <a:r>
+              <a:rPr lang="en-NZ" sz="2400" dirty="0" smtClean="0"/>
+              <a:t>employee for each week</a:t>
+            </a:r>
+            <a:endParaRPr lang="en-NZ" sz="2400" dirty="0"/>
+          </a:p>
+          <a:p>
+            <a:r>
+              <a:rPr lang="en-NZ" sz="2400" dirty="0"/>
+              <a:t>Compare the usage </a:t>
+            </a:r>
+            <a:r>
+              <a:rPr lang="en-NZ" sz="2400" dirty="0" smtClean="0"/>
+              <a:t>to other employees and the company average</a:t>
+            </a:r>
+            <a:endParaRPr lang="en-NZ" sz="2400" dirty="0"/>
+          </a:p>
+          <a:p>
+            <a:endParaRPr lang="en-NZ" sz="2400" dirty="0"/>
+          </a:p>
+          <a:p>
+            <a:r>
+              <a:rPr lang="en-NZ" sz="2400" dirty="0"/>
               <a:t>B</a:t>
             </a:r>
             <a:r>
-              <a:rPr lang="en-NZ" dirty="0" smtClean="0"/>
+              <a:rPr lang="en-NZ" sz="2400" dirty="0" smtClean="0"/>
               <a:t>ackground </a:t>
             </a:r>
             <a:r>
-              <a:rPr lang="en-NZ" dirty="0"/>
+              <a:rPr lang="en-NZ" sz="2400" dirty="0"/>
               <a:t>application which starts with Windows</a:t>
             </a:r>
           </a:p>
           <a:p>
             <a:r>
-              <a:rPr lang="en-NZ" dirty="0"/>
-              <a:t>W</a:t>
-            </a:r>
-            <a:r>
-              <a:rPr lang="en-NZ" dirty="0" smtClean="0"/>
-              <a:t>indow </a:t>
-            </a:r>
-            <a:r>
-              <a:rPr lang="en-NZ" dirty="0"/>
-              <a:t>can be opened which displays </a:t>
-            </a:r>
-            <a:r>
-              <a:rPr lang="en-NZ" dirty="0" smtClean="0"/>
-              <a:t>information</a:t>
-            </a:r>
-            <a:endParaRPr lang="en-NZ" dirty="0"/>
+              <a:rPr lang="en-NZ" sz="2400" dirty="0" smtClean="0"/>
+              <a:t>Client app on both mobile and Windows (Xamarin)</a:t>
+            </a:r>
+            <a:endParaRPr lang="en-NZ" sz="2400" dirty="0"/>
           </a:p>
           <a:p>
             <a:endParaRPr lang="en-NZ" dirty="0"/>
@@ -4269,7 +4206,7 @@
         </p:spPr>
         <p:txBody>
           <a:bodyPr>
-            <a:normAutofit fontScale="92500" lnSpcReduction="20000"/>
+            <a:normAutofit lnSpcReduction="10000"/>
           </a:bodyPr>
           <a:lstStyle/>
           <a:p>
@@ -4279,73 +4216,70 @@
             <a:endParaRPr lang="en-NZ" dirty="0"/>
           </a:p>
           <a:p>
+            <a:pPr marL="0" indent="0">
+              <a:buNone/>
+            </a:pPr>
             <a:endParaRPr lang="en-NZ" dirty="0" smtClean="0"/>
           </a:p>
           <a:p>
-            <a:endParaRPr lang="en-NZ" dirty="0" smtClean="0"/>
-          </a:p>
-          <a:p>
             <a:r>
               <a:rPr lang="en-NZ" sz="2400" dirty="0" smtClean="0"/>
-              <a:t>Project will be distributed as a windows desktop application</a:t>
-            </a:r>
-          </a:p>
-          <a:p>
+              <a:t>Windows desktop application + Mobile/Windows App</a:t>
+            </a:r>
+            <a:endParaRPr lang="en-NZ" sz="2400" dirty="0" smtClean="0"/>
+          </a:p>
+          <a:p>
+            <a:endParaRPr lang="en-NZ" sz="2400" dirty="0"/>
+          </a:p>
+          <a:p>
+            <a:r>
+              <a:rPr lang="en-NZ" sz="2400" dirty="0" err="1" smtClean="0"/>
+              <a:t>WorkTime</a:t>
+            </a:r>
             <a:r>
               <a:rPr lang="en-NZ" sz="2400" dirty="0" smtClean="0"/>
-              <a:t>Will be installed via an installer .exe file</a:t>
-            </a:r>
-          </a:p>
-          <a:p>
-            <a:endParaRPr lang="en-NZ" sz="2400" dirty="0"/>
+              <a:t> already exists</a:t>
+            </a:r>
+            <a:endParaRPr lang="en-NZ" sz="2400" dirty="0" smtClean="0"/>
           </a:p>
           <a:p>
             <a:r>
               <a:rPr lang="en-NZ" sz="2400" dirty="0" smtClean="0"/>
-              <a:t>Initial application will be released as </a:t>
-            </a:r>
-            <a:r>
-              <a:rPr lang="en-NZ" sz="2400" dirty="0"/>
-              <a:t>f</a:t>
-            </a:r>
-            <a:r>
-              <a:rPr lang="en-NZ" sz="2400" dirty="0" smtClean="0"/>
-              <a:t>reeware</a:t>
-            </a:r>
-          </a:p>
-          <a:p>
-            <a:r>
-              <a:rPr lang="en-NZ" sz="2400" dirty="0" smtClean="0"/>
-              <a:t>Premium version in the future for additional features</a:t>
-            </a:r>
+              <a:t>Our unique features:</a:t>
+            </a:r>
+            <a:endParaRPr lang="en-NZ" sz="2400" dirty="0" smtClean="0"/>
           </a:p>
           <a:p>
             <a:pPr lvl="1"/>
             <a:r>
               <a:rPr lang="en-NZ" sz="2100" dirty="0" smtClean="0"/>
-              <a:t>Notifications</a:t>
-            </a:r>
+              <a:t>Outlook Integration (Tasks/Meetings/Deadlines)</a:t>
+            </a:r>
+            <a:endParaRPr lang="en-NZ" sz="2100" dirty="0" smtClean="0"/>
           </a:p>
           <a:p>
             <a:pPr lvl="1"/>
             <a:r>
               <a:rPr lang="en-NZ" sz="2100" dirty="0" smtClean="0"/>
-              <a:t>Server to compare usage </a:t>
-            </a:r>
+              <a:t>Much more modern UI</a:t>
+            </a:r>
+            <a:endParaRPr lang="en-NZ" sz="2100" dirty="0" smtClean="0"/>
           </a:p>
           <a:p>
             <a:pPr lvl="1"/>
             <a:r>
               <a:rPr lang="en-NZ" sz="2100" dirty="0" smtClean="0"/>
-              <a:t>Suggestions to improve efficiency</a:t>
-            </a:r>
+              <a:t>More Analytics – Weekly/Monthly/Yearly trends</a:t>
+            </a:r>
+            <a:endParaRPr lang="en-NZ" sz="2100" dirty="0" smtClean="0"/>
           </a:p>
           <a:p>
             <a:pPr lvl="1"/>
             <a:r>
               <a:rPr lang="en-NZ" sz="2100" dirty="0" smtClean="0"/>
-              <a:t>Web browser tracking</a:t>
-            </a:r>
+              <a:t>Positive reinforcement rewards system</a:t>
+            </a:r>
+            <a:endParaRPr lang="en-NZ" sz="2100" dirty="0" smtClean="0"/>
           </a:p>
           <a:p>
             <a:pPr lvl="1"/>
@@ -4636,34 +4570,16 @@
           <a:lstStyle/>
           <a:p>
             <a:r>
-              <a:rPr lang="en-NZ" dirty="0"/>
-              <a:t>Visual Design II</a:t>
-            </a:r>
-          </a:p>
-        </p:txBody>
-      </p:sp>
-      <p:sp>
-        <p:nvSpPr>
-          <p:cNvPr id="4" name="Text Placeholder 3"/>
-          <p:cNvSpPr>
-            <a:spLocks noGrp="1"/>
-          </p:cNvSpPr>
-          <p:nvPr>
-            <p:ph type="body" sz="half" idx="2"/>
-          </p:nvPr>
-        </p:nvSpPr>
-        <p:spPr/>
-        <p:txBody>
-          <a:bodyPr/>
-          <a:lstStyle/>
-          <a:p>
+              <a:rPr lang="en-NZ" dirty="0" smtClean="0"/>
+              <a:t>Database</a:t>
+            </a:r>
             <a:endParaRPr lang="en-NZ" dirty="0"/>
           </a:p>
         </p:txBody>
       </p:sp>
       <p:pic>
         <p:nvPicPr>
-          <p:cNvPr id="8" name="Picture Placeholder 7"/>
+          <p:cNvPr id="6" name="Picture Placeholder 5"/>
           <p:cNvPicPr>
             <a:picLocks noGrp="1" noChangeAspect="1"/>
           </p:cNvPicPr>
@@ -4672,24 +4588,41 @@
           </p:nvPr>
         </p:nvPicPr>
         <p:blipFill>
-          <a:blip r:embed="rId2">
-            <a:extLst>
-              <a:ext uri="{28A0092B-C50C-407E-A947-70E740481C1C}">
-                <a14:useLocalDpi xmlns:a14="http://schemas.microsoft.com/office/drawing/2010/main" val="0"/>
-              </a:ext>
-            </a:extLst>
-          </a:blip>
-          <a:srcRect l="18" r="18"/>
+          <a:blip r:embed="rId2"/>
+          <a:srcRect l="4249" r="4249"/>
           <a:stretch>
             <a:fillRect/>
           </a:stretch>
         </p:blipFill>
-        <p:spPr/>
+        <p:spPr>
+          <a:prstGeom prst="rect">
+            <a:avLst/>
+          </a:prstGeom>
+        </p:spPr>
       </p:pic>
+      <p:sp>
+        <p:nvSpPr>
+          <p:cNvPr id="4" name="Text Placeholder 3"/>
+          <p:cNvSpPr>
+            <a:spLocks noGrp="1"/>
+          </p:cNvSpPr>
+          <p:nvPr>
+            <p:ph type="body" sz="half" idx="2"/>
+          </p:nvPr>
+        </p:nvSpPr>
+        <p:spPr/>
+        <p:txBody>
+          <a:bodyPr/>
+          <a:lstStyle/>
+          <a:p>
+            <a:endParaRPr lang="en-NZ"/>
+          </a:p>
+        </p:txBody>
+      </p:sp>
     </p:spTree>
     <p:extLst>
       <p:ext uri="{BB962C8B-B14F-4D97-AF65-F5344CB8AC3E}">
-        <p14:creationId xmlns:p14="http://schemas.microsoft.com/office/powerpoint/2010/main" val="3048752527"/>
+        <p14:creationId xmlns:p14="http://schemas.microsoft.com/office/powerpoint/2010/main" val="3276679459"/>
       </p:ext>
     </p:extLst>
   </p:cSld>
@@ -4740,6 +4673,109 @@
           <a:p>
             <a:r>
               <a:rPr lang="en-NZ" dirty="0"/>
+              <a:t>Visual Design II</a:t>
+            </a:r>
+          </a:p>
+        </p:txBody>
+      </p:sp>
+      <p:sp>
+        <p:nvSpPr>
+          <p:cNvPr id="4" name="Text Placeholder 3"/>
+          <p:cNvSpPr>
+            <a:spLocks noGrp="1"/>
+          </p:cNvSpPr>
+          <p:nvPr>
+            <p:ph type="body" sz="half" idx="2"/>
+          </p:nvPr>
+        </p:nvSpPr>
+        <p:spPr/>
+        <p:txBody>
+          <a:bodyPr/>
+          <a:lstStyle/>
+          <a:p>
+            <a:endParaRPr lang="en-NZ" dirty="0"/>
+          </a:p>
+        </p:txBody>
+      </p:sp>
+      <p:pic>
+        <p:nvPicPr>
+          <p:cNvPr id="8" name="Picture Placeholder 7"/>
+          <p:cNvPicPr>
+            <a:picLocks noGrp="1" noChangeAspect="1"/>
+          </p:cNvPicPr>
+          <p:nvPr>
+            <p:ph type="pic" idx="1"/>
+          </p:nvPr>
+        </p:nvPicPr>
+        <p:blipFill>
+          <a:blip r:embed="rId2">
+            <a:extLst>
+              <a:ext uri="{28A0092B-C50C-407E-A947-70E740481C1C}">
+                <a14:useLocalDpi xmlns:a14="http://schemas.microsoft.com/office/drawing/2010/main" val="0"/>
+              </a:ext>
+            </a:extLst>
+          </a:blip>
+          <a:srcRect l="18" r="18"/>
+          <a:stretch>
+            <a:fillRect/>
+          </a:stretch>
+        </p:blipFill>
+        <p:spPr/>
+      </p:pic>
+    </p:spTree>
+    <p:extLst>
+      <p:ext uri="{BB962C8B-B14F-4D97-AF65-F5344CB8AC3E}">
+        <p14:creationId xmlns:p14="http://schemas.microsoft.com/office/powerpoint/2010/main" val="3048752527"/>
+      </p:ext>
+    </p:extLst>
+  </p:cSld>
+  <p:clrMapOvr>
+    <a:masterClrMapping/>
+  </p:clrMapOvr>
+  <p:timing>
+    <p:tnLst>
+      <p:par>
+        <p:cTn id="1" dur="indefinite" restart="never" nodeType="tmRoot"/>
+      </p:par>
+    </p:tnLst>
+  </p:timing>
+</p:sld>
+</file>
+
+<file path=ppt/slides/slide9.xml><?xml version="1.0" encoding="utf-8"?>
+<p:sld xmlns:a="http://schemas.openxmlformats.org/drawingml/2006/main" xmlns:r="http://schemas.openxmlformats.org/officeDocument/2006/relationships" xmlns:p="http://schemas.openxmlformats.org/presentationml/2006/main">
+  <p:cSld>
+    <p:spTree>
+      <p:nvGrpSpPr>
+        <p:cNvPr id="1" name=""/>
+        <p:cNvGrpSpPr/>
+        <p:nvPr/>
+      </p:nvGrpSpPr>
+      <p:grpSpPr>
+        <a:xfrm>
+          <a:off x="0" y="0"/>
+          <a:ext cx="0" cy="0"/>
+          <a:chOff x="0" y="0"/>
+          <a:chExt cx="0" cy="0"/>
+        </a:xfrm>
+      </p:grpSpPr>
+      <p:sp>
+        <p:nvSpPr>
+          <p:cNvPr id="2" name="Title 1"/>
+          <p:cNvSpPr>
+            <a:spLocks noGrp="1"/>
+          </p:cNvSpPr>
+          <p:nvPr>
+            <p:ph type="title"/>
+          </p:nvPr>
+        </p:nvSpPr>
+        <p:spPr/>
+        <p:txBody>
+          <a:bodyPr/>
+          <a:lstStyle/>
+          <a:p>
+            <a:r>
+              <a:rPr lang="en-NZ" dirty="0"/>
               <a:t>Conclusions</a:t>
             </a:r>
           </a:p>
@@ -4757,8 +4793,8 @@
         </p:nvSpPr>
         <p:spPr>
           <a:xfrm>
-            <a:off x="3869268" y="1692066"/>
-            <a:ext cx="7315200" cy="4292681"/>
+            <a:off x="3869268" y="1888620"/>
+            <a:ext cx="7315200" cy="4096127"/>
           </a:xfrm>
         </p:spPr>
         <p:txBody>
@@ -4766,46 +4802,46 @@
           <a:lstStyle/>
           <a:p>
             <a:r>
-              <a:rPr lang="en-NZ" dirty="0"/>
+              <a:rPr lang="en-NZ" sz="2400" dirty="0"/>
               <a:t>People want to waste less time on a </a:t>
             </a:r>
             <a:r>
-              <a:rPr lang="en-NZ" dirty="0" smtClean="0"/>
+              <a:rPr lang="en-NZ" sz="2400" dirty="0" smtClean="0"/>
               <a:t>computer</a:t>
             </a:r>
           </a:p>
           <a:p>
-            <a:endParaRPr lang="en-NZ" dirty="0"/>
-          </a:p>
-          <a:p>
-            <a:r>
-              <a:rPr lang="en-NZ" dirty="0"/>
+            <a:endParaRPr lang="en-NZ" sz="2400" dirty="0"/>
+          </a:p>
+          <a:p>
+            <a:r>
+              <a:rPr lang="en-NZ" sz="2400" dirty="0"/>
               <a:t>Timekeeper will track usage of applications </a:t>
             </a:r>
-            <a:endParaRPr lang="en-NZ" dirty="0" smtClean="0"/>
-          </a:p>
-          <a:p>
-            <a:endParaRPr lang="en-NZ" dirty="0" smtClean="0"/>
-          </a:p>
-          <a:p>
-            <a:r>
-              <a:rPr lang="en-NZ" dirty="0" smtClean="0"/>
+            <a:endParaRPr lang="en-NZ" sz="2400" dirty="0" smtClean="0"/>
+          </a:p>
+          <a:p>
+            <a:endParaRPr lang="en-NZ" sz="2400" dirty="0" smtClean="0"/>
+          </a:p>
+          <a:p>
+            <a:r>
+              <a:rPr lang="en-NZ" sz="2400" dirty="0" smtClean="0"/>
               <a:t>Will also be able to rank the applications by usage </a:t>
             </a:r>
           </a:p>
           <a:p>
-            <a:endParaRPr lang="en-NZ" dirty="0"/>
-          </a:p>
-          <a:p>
-            <a:r>
-              <a:rPr lang="en-NZ" dirty="0"/>
+            <a:endParaRPr lang="en-NZ" sz="2400" dirty="0"/>
+          </a:p>
+          <a:p>
+            <a:r>
+              <a:rPr lang="en-NZ" sz="2400" dirty="0"/>
               <a:t>This will show people where they can reduce time spent and where they should increase time </a:t>
             </a:r>
             <a:r>
-              <a:rPr lang="en-NZ" dirty="0" smtClean="0"/>
+              <a:rPr lang="en-NZ" sz="2400" dirty="0" smtClean="0"/>
               <a:t>spent</a:t>
             </a:r>
-            <a:endParaRPr lang="en-NZ" dirty="0"/>
+            <a:endParaRPr lang="en-NZ" sz="2400" dirty="0"/>
           </a:p>
           <a:p>
             <a:pPr lvl="1"/>

</xml_diff>

<commit_message>
updated pwrpnt and script
</commit_message>
<xml_diff>
--- a/Planning/Timekeeper.pptx
+++ b/Planning/Timekeeper.pptx
@@ -6,14 +6,14 @@
   </p:sldMasterIdLst>
   <p:sldIdLst>
     <p:sldId id="256" r:id="rId2"/>
-    <p:sldId id="263" r:id="rId3"/>
-    <p:sldId id="257" r:id="rId4"/>
+    <p:sldId id="257" r:id="rId3"/>
+    <p:sldId id="267" r:id="rId4"/>
     <p:sldId id="258" r:id="rId5"/>
     <p:sldId id="262" r:id="rId6"/>
-    <p:sldId id="259" r:id="rId7"/>
-    <p:sldId id="264" r:id="rId8"/>
-    <p:sldId id="260" r:id="rId9"/>
-    <p:sldId id="261" r:id="rId10"/>
+    <p:sldId id="264" r:id="rId7"/>
+    <p:sldId id="263" r:id="rId8"/>
+    <p:sldId id="265" r:id="rId9"/>
+    <p:sldId id="266" r:id="rId10"/>
   </p:sldIdLst>
   <p:sldSz cx="12192000" cy="6858000"/>
   <p:notesSz cx="6858000" cy="9144000"/>
@@ -345,7 +345,7 @@
             <a:fld id="{5586B75A-687E-405C-8A0B-8D00578BA2C3}" type="datetimeFigureOut">
               <a:rPr lang="en-US" dirty="0"/>
               <a:pPr/>
-              <a:t>3/4/2017</a:t>
+              <a:t>3/12/2017</a:t>
             </a:fld>
             <a:endParaRPr lang="en-US" dirty="0"/>
           </a:p>
@@ -512,7 +512,7 @@
             <a:fld id="{5586B75A-687E-405C-8A0B-8D00578BA2C3}" type="datetimeFigureOut">
               <a:rPr lang="en-US" dirty="0"/>
               <a:pPr/>
-              <a:t>3/4/2017</a:t>
+              <a:t>3/12/2017</a:t>
             </a:fld>
             <a:endParaRPr lang="en-US" dirty="0"/>
           </a:p>
@@ -689,7 +689,7 @@
             <a:fld id="{5586B75A-687E-405C-8A0B-8D00578BA2C3}" type="datetimeFigureOut">
               <a:rPr lang="en-US" dirty="0"/>
               <a:pPr/>
-              <a:t>3/4/2017</a:t>
+              <a:t>3/12/2017</a:t>
             </a:fld>
             <a:endParaRPr lang="en-US" dirty="0"/>
           </a:p>
@@ -856,7 +856,7 @@
             <a:fld id="{5586B75A-687E-405C-8A0B-8D00578BA2C3}" type="datetimeFigureOut">
               <a:rPr lang="en-US" dirty="0"/>
               <a:pPr/>
-              <a:t>3/4/2017</a:t>
+              <a:t>3/12/2017</a:t>
             </a:fld>
             <a:endParaRPr lang="en-US" dirty="0"/>
           </a:p>
@@ -1111,7 +1111,7 @@
             <a:fld id="{5586B75A-687E-405C-8A0B-8D00578BA2C3}" type="datetimeFigureOut">
               <a:rPr lang="en-US" dirty="0"/>
               <a:pPr/>
-              <a:t>3/4/2017</a:t>
+              <a:t>3/12/2017</a:t>
             </a:fld>
             <a:endParaRPr lang="en-US" dirty="0"/>
           </a:p>
@@ -1396,7 +1396,7 @@
             <a:fld id="{5586B75A-687E-405C-8A0B-8D00578BA2C3}" type="datetimeFigureOut">
               <a:rPr lang="en-US" dirty="0"/>
               <a:pPr/>
-              <a:t>3/4/2017</a:t>
+              <a:t>3/12/2017</a:t>
             </a:fld>
             <a:endParaRPr lang="en-US" dirty="0"/>
           </a:p>
@@ -1835,7 +1835,7 @@
             <a:fld id="{5586B75A-687E-405C-8A0B-8D00578BA2C3}" type="datetimeFigureOut">
               <a:rPr lang="en-US" dirty="0"/>
               <a:pPr/>
-              <a:t>3/4/2017</a:t>
+              <a:t>3/12/2017</a:t>
             </a:fld>
             <a:endParaRPr lang="en-US" dirty="0"/>
           </a:p>
@@ -1950,7 +1950,7 @@
             <a:fld id="{5586B75A-687E-405C-8A0B-8D00578BA2C3}" type="datetimeFigureOut">
               <a:rPr lang="en-US" dirty="0"/>
               <a:pPr/>
-              <a:t>3/4/2017</a:t>
+              <a:t>3/12/2017</a:t>
             </a:fld>
             <a:endParaRPr lang="en-US" dirty="0"/>
           </a:p>
@@ -2042,7 +2042,7 @@
             <a:fld id="{5586B75A-687E-405C-8A0B-8D00578BA2C3}" type="datetimeFigureOut">
               <a:rPr lang="en-US" dirty="0"/>
               <a:pPr/>
-              <a:t>3/4/2017</a:t>
+              <a:t>3/12/2017</a:t>
             </a:fld>
             <a:endParaRPr lang="en-US" dirty="0"/>
           </a:p>
@@ -2327,7 +2327,7 @@
             <a:fld id="{5586B75A-687E-405C-8A0B-8D00578BA2C3}" type="datetimeFigureOut">
               <a:rPr lang="en-US" dirty="0"/>
               <a:pPr/>
-              <a:t>3/4/2017</a:t>
+              <a:t>3/12/2017</a:t>
             </a:fld>
             <a:endParaRPr lang="en-US" dirty="0"/>
           </a:p>
@@ -2597,7 +2597,7 @@
             <a:fld id="{5586B75A-687E-405C-8A0B-8D00578BA2C3}" type="datetimeFigureOut">
               <a:rPr lang="en-US" dirty="0"/>
               <a:pPr/>
-              <a:t>3/4/2017</a:t>
+              <a:t>3/12/2017</a:t>
             </a:fld>
             <a:endParaRPr lang="en-US" dirty="0"/>
           </a:p>
@@ -2891,7 +2891,7 @@
             <a:fld id="{5586B75A-687E-405C-8A0B-8D00578BA2C3}" type="datetimeFigureOut">
               <a:rPr lang="en-US" dirty="0"/>
               <a:pPr/>
-              <a:t>3/4/2017</a:t>
+              <a:t>3/12/2017</a:t>
             </a:fld>
             <a:endParaRPr lang="en-US" dirty="0"/>
           </a:p>
@@ -3422,36 +3422,6 @@
       </p:sp>
       <p:pic>
         <p:nvPicPr>
-          <p:cNvPr id="5" name="Picture 4"/>
-          <p:cNvPicPr>
-            <a:picLocks noChangeAspect="1"/>
-          </p:cNvPicPr>
-          <p:nvPr/>
-        </p:nvPicPr>
-        <p:blipFill>
-          <a:blip r:embed="rId2">
-            <a:extLst>
-              <a:ext uri="{28A0092B-C50C-407E-A947-70E740481C1C}">
-                <a14:useLocalDpi xmlns:a14="http://schemas.microsoft.com/office/drawing/2010/main" val="0"/>
-              </a:ext>
-            </a:extLst>
-          </a:blip>
-          <a:stretch>
-            <a:fillRect/>
-          </a:stretch>
-        </p:blipFill>
-        <p:spPr>
-          <a:xfrm>
-            <a:off x="9401088" y="1599346"/>
-            <a:ext cx="2653468" cy="2653468"/>
-          </a:xfrm>
-          <a:prstGeom prst="rect">
-            <a:avLst/>
-          </a:prstGeom>
-        </p:spPr>
-      </p:pic>
-      <p:pic>
-        <p:nvPicPr>
           <p:cNvPr id="1026" name="Picture 2" descr="http://msa.ms/imaginecup/static/images/iclogo.png"/>
           <p:cNvPicPr>
             <a:picLocks noChangeAspect="1" noChangeArrowheads="1"/>
@@ -3459,7 +3429,7 @@
           <p:nvPr/>
         </p:nvPicPr>
         <p:blipFill>
-          <a:blip r:embed="rId3">
+          <a:blip r:embed="rId2">
             <a:clrChange>
               <a:clrFrom>
                 <a:srgbClr val="FFFFFF"/>
@@ -3510,7 +3480,7 @@
           <p:nvPr/>
         </p:nvPicPr>
         <p:blipFill>
-          <a:blip r:embed="rId4">
+          <a:blip r:embed="rId3">
             <a:extLst>
               <a:ext uri="{28A0092B-C50C-407E-A947-70E740481C1C}">
                 <a14:useLocalDpi xmlns:a14="http://schemas.microsoft.com/office/drawing/2010/main" val="0"/>
@@ -3595,10 +3565,9 @@
           <a:lstStyle/>
           <a:p>
             <a:r>
-              <a:rPr lang="en-NZ" dirty="0" smtClean="0"/>
-              <a:t>Team</a:t>
-            </a:r>
-            <a:endParaRPr lang="en-NZ" dirty="0"/>
+              <a:rPr lang="en-NZ" dirty="0"/>
+              <a:t>Problem</a:t>
+            </a:r>
           </a:p>
         </p:txBody>
       </p:sp>
@@ -3614,236 +3583,74 @@
         </p:nvSpPr>
         <p:spPr>
           <a:xfrm>
-            <a:off x="3869268" y="811979"/>
-            <a:ext cx="7315200" cy="5224897"/>
+            <a:off x="3869268" y="864108"/>
+            <a:ext cx="7315200" cy="4571017"/>
           </a:xfrm>
         </p:spPr>
         <p:txBody>
           <a:bodyPr>
-            <a:normAutofit/>
+            <a:noAutofit/>
           </a:bodyPr>
           <a:lstStyle/>
           <a:p>
-            <a:endParaRPr lang="en-NZ" dirty="0" smtClean="0"/>
-          </a:p>
-          <a:p>
-            <a:endParaRPr lang="en-NZ" dirty="0"/>
-          </a:p>
-          <a:p>
-            <a:r>
-              <a:rPr lang="en-NZ" dirty="0" smtClean="0"/>
-              <a:t>We are third year computer systems engineering students</a:t>
-            </a:r>
-          </a:p>
-          <a:p>
-            <a:r>
-              <a:rPr lang="en-NZ" dirty="0" smtClean="0"/>
-              <a:t>Looking to innovate and help people like ourselves</a:t>
-            </a:r>
-          </a:p>
-          <a:p>
-            <a:endParaRPr lang="en-NZ" dirty="0"/>
-          </a:p>
-          <a:p>
-            <a:r>
-              <a:rPr lang="en-NZ" dirty="0"/>
-              <a:t>We have experience in </a:t>
-            </a:r>
-            <a:r>
-              <a:rPr lang="en-NZ" dirty="0" smtClean="0"/>
-              <a:t>building:</a:t>
-            </a:r>
-          </a:p>
-          <a:p>
-            <a:pPr marL="0" indent="0">
-              <a:buNone/>
-            </a:pPr>
-            <a:endParaRPr lang="en-NZ" dirty="0"/>
-          </a:p>
-          <a:p>
-            <a:pPr marL="0" indent="0">
-              <a:buNone/>
-            </a:pPr>
-            <a:endParaRPr lang="en-NZ" dirty="0" smtClean="0"/>
-          </a:p>
-          <a:p>
-            <a:pPr marL="0" indent="0">
-              <a:buNone/>
-            </a:pPr>
-            <a:endParaRPr lang="en-NZ" dirty="0"/>
-          </a:p>
-          <a:p>
-            <a:pPr marL="0" indent="0">
-              <a:buNone/>
-            </a:pPr>
-            <a:endParaRPr lang="en-NZ" dirty="0"/>
-          </a:p>
-          <a:p>
-            <a:r>
-              <a:rPr lang="en-NZ" dirty="0" smtClean="0"/>
-              <a:t>Windows desktop application collects data</a:t>
-            </a:r>
-          </a:p>
-          <a:p>
-            <a:r>
-              <a:rPr lang="en-NZ" dirty="0" smtClean="0"/>
-              <a:t>Xamarin front end (Windows, Android, </a:t>
-            </a:r>
-            <a:r>
-              <a:rPr lang="en-NZ" dirty="0" err="1" smtClean="0"/>
-              <a:t>iOS</a:t>
-            </a:r>
-            <a:r>
-              <a:rPr lang="en-NZ" dirty="0" smtClean="0"/>
-              <a:t> apps)</a:t>
-            </a:r>
-          </a:p>
-          <a:p>
-            <a:pPr marL="502920" lvl="1" indent="0">
-              <a:buNone/>
-            </a:pPr>
-            <a:endParaRPr lang="en-NZ" dirty="0" smtClean="0"/>
-          </a:p>
-          <a:p>
-            <a:pPr lvl="1"/>
-            <a:endParaRPr lang="en-NZ" dirty="0" smtClean="0"/>
-          </a:p>
-          <a:p>
-            <a:pPr marL="0" indent="0">
-              <a:buNone/>
-            </a:pPr>
-            <a:endParaRPr lang="en-NZ" dirty="0" smtClean="0"/>
-          </a:p>
-          <a:p>
-            <a:endParaRPr lang="en-NZ" dirty="0"/>
-          </a:p>
-        </p:txBody>
-      </p:sp>
-      <p:pic>
-        <p:nvPicPr>
-          <p:cNvPr id="2050" name="Picture 2" descr="Image result for android logo"/>
-          <p:cNvPicPr>
-            <a:picLocks noChangeAspect="1" noChangeArrowheads="1"/>
-          </p:cNvPicPr>
-          <p:nvPr/>
-        </p:nvPicPr>
-        <p:blipFill rotWithShape="1">
-          <a:blip r:embed="rId2">
-            <a:extLst>
-              <a:ext uri="{28A0092B-C50C-407E-A947-70E740481C1C}">
-                <a14:useLocalDpi xmlns:a14="http://schemas.microsoft.com/office/drawing/2010/main" val="0"/>
-              </a:ext>
-            </a:extLst>
-          </a:blip>
-          <a:srcRect l="19372" t="13333" r="18775" b="13909"/>
-          <a:stretch/>
-        </p:blipFill>
-        <p:spPr bwMode="auto">
-          <a:xfrm>
-            <a:off x="4236719" y="2769107"/>
-            <a:ext cx="1252393" cy="1473200"/>
-          </a:xfrm>
-          <a:prstGeom prst="rect">
-            <a:avLst/>
-          </a:prstGeom>
-          <a:noFill/>
-          <a:extLst>
-            <a:ext uri="{909E8E84-426E-40DD-AFC4-6F175D3DCCD1}">
-              <a14:hiddenFill xmlns:a14="http://schemas.microsoft.com/office/drawing/2010/main">
-                <a:solidFill>
-                  <a:srgbClr val="FFFFFF"/>
-                </a:solidFill>
-              </a14:hiddenFill>
-            </a:ext>
-          </a:extLst>
-        </p:spPr>
-      </p:pic>
-      <p:pic>
-        <p:nvPicPr>
-          <p:cNvPr id="2054" name="Picture 6" descr="https://jimboireland.files.wordpress.com/2016/04/windows-store-logo.png"/>
-          <p:cNvPicPr>
-            <a:picLocks noChangeAspect="1" noChangeArrowheads="1"/>
-          </p:cNvPicPr>
-          <p:nvPr/>
-        </p:nvPicPr>
-        <p:blipFill>
-          <a:blip r:embed="rId3">
-            <a:extLst>
-              <a:ext uri="{28A0092B-C50C-407E-A947-70E740481C1C}">
-                <a14:useLocalDpi xmlns:a14="http://schemas.microsoft.com/office/drawing/2010/main" val="0"/>
-              </a:ext>
-            </a:extLst>
-          </a:blip>
-          <a:srcRect/>
-          <a:stretch>
-            <a:fillRect/>
-          </a:stretch>
-        </p:blipFill>
-        <p:spPr bwMode="auto">
-          <a:xfrm>
-            <a:off x="5856563" y="2664301"/>
-            <a:ext cx="1682812" cy="1682812"/>
-          </a:xfrm>
-          <a:prstGeom prst="rect">
-            <a:avLst/>
-          </a:prstGeom>
-          <a:noFill/>
-          <a:extLst>
-            <a:ext uri="{909E8E84-426E-40DD-AFC4-6F175D3DCCD1}">
-              <a14:hiddenFill xmlns:a14="http://schemas.microsoft.com/office/drawing/2010/main">
-                <a:solidFill>
-                  <a:srgbClr val="FFFFFF"/>
-                </a:solidFill>
-              </a14:hiddenFill>
-            </a:ext>
-          </a:extLst>
-        </p:spPr>
-      </p:pic>
-      <p:pic>
-        <p:nvPicPr>
-          <p:cNvPr id="2056" name="Picture 8" descr="http://www.underconsideration.com/brandnew/archives/microsoft_edge_logo_detail.png"/>
-          <p:cNvPicPr>
-            <a:picLocks noChangeAspect="1" noChangeArrowheads="1"/>
-          </p:cNvPicPr>
-          <p:nvPr/>
-        </p:nvPicPr>
-        <p:blipFill>
-          <a:blip r:embed="rId4">
-            <a:extLst>
-              <a:ext uri="{28A0092B-C50C-407E-A947-70E740481C1C}">
-                <a14:useLocalDpi xmlns:a14="http://schemas.microsoft.com/office/drawing/2010/main" val="0"/>
-              </a:ext>
-            </a:extLst>
-          </a:blip>
-          <a:srcRect/>
-          <a:stretch>
-            <a:fillRect/>
-          </a:stretch>
-        </p:blipFill>
-        <p:spPr bwMode="auto">
-          <a:xfrm>
-            <a:off x="7906826" y="2769107"/>
-            <a:ext cx="1345388" cy="1473200"/>
-          </a:xfrm>
-          <a:prstGeom prst="rect">
-            <a:avLst/>
-          </a:prstGeom>
-          <a:noFill/>
-          <a:extLst>
-            <a:ext uri="{909E8E84-426E-40DD-AFC4-6F175D3DCCD1}">
-              <a14:hiddenFill xmlns:a14="http://schemas.microsoft.com/office/drawing/2010/main">
-                <a:solidFill>
-                  <a:srgbClr val="FFFFFF"/>
-                </a:solidFill>
-              </a14:hiddenFill>
-            </a:ext>
-          </a:extLst>
-        </p:spPr>
-      </p:pic>
+            <a:r>
+              <a:rPr lang="en-NZ" sz="2400" dirty="0" smtClean="0"/>
+              <a:t>New </a:t>
+            </a:r>
+            <a:r>
+              <a:rPr lang="en-NZ" sz="2400" dirty="0"/>
+              <a:t>Zealanders work about 15% longer than the OECD average </a:t>
+            </a:r>
+            <a:r>
+              <a:rPr lang="en-NZ" sz="2400" dirty="0" smtClean="0"/>
+              <a:t>and </a:t>
+            </a:r>
+            <a:r>
+              <a:rPr lang="en-NZ" sz="2400" dirty="0"/>
+              <a:t>produce about 20% less output per person</a:t>
+            </a:r>
+            <a:r>
+              <a:rPr lang="en-NZ" sz="2400" dirty="0" smtClean="0"/>
+              <a:t>.</a:t>
+            </a:r>
+          </a:p>
+          <a:p>
+            <a:r>
+              <a:rPr lang="en-NZ" sz="2400" dirty="0" smtClean="0"/>
+              <a:t>Timekee</a:t>
+            </a:r>
+            <a:r>
+              <a:rPr lang="en-NZ" sz="2400" dirty="0" smtClean="0"/>
+              <a:t>per aims to address this problem of reduced productivity in the workplace</a:t>
+            </a:r>
+          </a:p>
+          <a:p>
+            <a:r>
+              <a:rPr lang="en-NZ" sz="2400" dirty="0"/>
+              <a:t>Computers are productive, but also distracting</a:t>
+            </a:r>
+          </a:p>
+          <a:p>
+            <a:r>
+              <a:rPr lang="en-NZ" sz="2400" dirty="0" smtClean="0"/>
+              <a:t>With increased productivity comes increased profits and companies do better financially</a:t>
+            </a:r>
+          </a:p>
+          <a:p>
+            <a:r>
+              <a:rPr lang="en-NZ" sz="2400" dirty="0" smtClean="0"/>
+              <a:t>Allows companies to better support New Zealanders</a:t>
+            </a:r>
+          </a:p>
+          <a:p>
+            <a:endParaRPr lang="en-NZ" sz="2400" dirty="0" smtClean="0"/>
+          </a:p>
+        </p:txBody>
+      </p:sp>
     </p:spTree>
     <p:extLst>
       <p:ext uri="{BB962C8B-B14F-4D97-AF65-F5344CB8AC3E}">
-        <p14:creationId xmlns:p14="http://schemas.microsoft.com/office/powerpoint/2010/main" val="3644174181"/>
+        <p14:creationId xmlns:p14="http://schemas.microsoft.com/office/powerpoint/2010/main" val="554901423"/>
       </p:ext>
     </p:extLst>
   </p:cSld>
@@ -3893,115 +3700,336 @@
           <a:lstStyle/>
           <a:p>
             <a:r>
-              <a:rPr lang="en-NZ" dirty="0"/>
-              <a:t>Problem</a:t>
-            </a:r>
-          </a:p>
-        </p:txBody>
-      </p:sp>
-      <p:sp>
-        <p:nvSpPr>
-          <p:cNvPr id="3" name="Content Placeholder 2"/>
-          <p:cNvSpPr>
-            <a:spLocks noGrp="1"/>
-          </p:cNvSpPr>
-          <p:nvPr>
-            <p:ph idx="1"/>
-          </p:nvPr>
-        </p:nvSpPr>
+              <a:rPr lang="en-NZ" dirty="0" smtClean="0"/>
+              <a:t>Distractions</a:t>
+            </a:r>
+            <a:endParaRPr lang="en-NZ" dirty="0"/>
+          </a:p>
+        </p:txBody>
+      </p:sp>
+      <p:pic>
+        <p:nvPicPr>
+          <p:cNvPr id="4" name="Picture 2" descr="http://www.myiconfinder.com/uploads/iconsets/893bc087e7bd3e769c6158c0c60bf4c4-gag.png"/>
+          <p:cNvPicPr>
+            <a:picLocks noChangeAspect="1" noChangeArrowheads="1"/>
+          </p:cNvPicPr>
+          <p:nvPr/>
+        </p:nvPicPr>
+        <p:blipFill rotWithShape="1">
+          <a:blip r:embed="rId2">
+            <a:extLst>
+              <a:ext uri="{28A0092B-C50C-407E-A947-70E740481C1C}">
+                <a14:useLocalDpi xmlns:a14="http://schemas.microsoft.com/office/drawing/2010/main" val="0"/>
+              </a:ext>
+            </a:extLst>
+          </a:blip>
+          <a:srcRect l="25723" t="22365" r="25036" b="22261"/>
+          <a:stretch/>
+        </p:blipFill>
+        <p:spPr bwMode="auto">
+          <a:xfrm>
+            <a:off x="10350307" y="3345678"/>
+            <a:ext cx="1193084" cy="1341689"/>
+          </a:xfrm>
+          <a:prstGeom prst="rect">
+            <a:avLst/>
+          </a:prstGeom>
+          <a:noFill/>
+          <a:extLst>
+            <a:ext uri="{909E8E84-426E-40DD-AFC4-6F175D3DCCD1}">
+              <a14:hiddenFill xmlns:a14="http://schemas.microsoft.com/office/drawing/2010/main">
+                <a:solidFill>
+                  <a:srgbClr val="FFFFFF"/>
+                </a:solidFill>
+              </a14:hiddenFill>
+            </a:ext>
+          </a:extLst>
+        </p:spPr>
+      </p:pic>
+      <p:pic>
+        <p:nvPicPr>
+          <p:cNvPr id="5" name="Picture 4" descr="https://cdn0.iconfinder.com/data/icons/social-flat-rounded-rects/512/facebook-256.png"/>
+          <p:cNvPicPr>
+            <a:picLocks noChangeAspect="1" noChangeArrowheads="1"/>
+          </p:cNvPicPr>
+          <p:nvPr/>
+        </p:nvPicPr>
+        <p:blipFill>
+          <a:blip r:embed="rId3">
+            <a:extLst>
+              <a:ext uri="{28A0092B-C50C-407E-A947-70E740481C1C}">
+                <a14:useLocalDpi xmlns:a14="http://schemas.microsoft.com/office/drawing/2010/main" val="0"/>
+              </a:ext>
+            </a:extLst>
+          </a:blip>
+          <a:srcRect/>
+          <a:stretch>
+            <a:fillRect/>
+          </a:stretch>
+        </p:blipFill>
+        <p:spPr bwMode="auto">
+          <a:xfrm>
+            <a:off x="10201702" y="1858710"/>
+            <a:ext cx="1341689" cy="1341689"/>
+          </a:xfrm>
+          <a:prstGeom prst="rect">
+            <a:avLst/>
+          </a:prstGeom>
+          <a:noFill/>
+          <a:extLst>
+            <a:ext uri="{909E8E84-426E-40DD-AFC4-6F175D3DCCD1}">
+              <a14:hiddenFill xmlns:a14="http://schemas.microsoft.com/office/drawing/2010/main">
+                <a:solidFill>
+                  <a:srgbClr val="FFFFFF"/>
+                </a:solidFill>
+              </a14:hiddenFill>
+            </a:ext>
+          </a:extLst>
+        </p:spPr>
+      </p:pic>
+      <p:pic>
+        <p:nvPicPr>
+          <p:cNvPr id="6" name="Picture 6" descr="http://vignette2.wikia.nocookie.net/drunken-peasants-podcast/images/e/e0/Tumblr_icon.png/revision/latest?cb=20160116002821"/>
+          <p:cNvPicPr>
+            <a:picLocks noChangeAspect="1" noChangeArrowheads="1"/>
+          </p:cNvPicPr>
+          <p:nvPr/>
+        </p:nvPicPr>
+        <p:blipFill>
+          <a:blip r:embed="rId4">
+            <a:extLst>
+              <a:ext uri="{28A0092B-C50C-407E-A947-70E740481C1C}">
+                <a14:useLocalDpi xmlns:a14="http://schemas.microsoft.com/office/drawing/2010/main" val="0"/>
+              </a:ext>
+            </a:extLst>
+          </a:blip>
+          <a:srcRect/>
+          <a:stretch>
+            <a:fillRect/>
+          </a:stretch>
+        </p:blipFill>
+        <p:spPr bwMode="auto">
+          <a:xfrm>
+            <a:off x="10276004" y="4832646"/>
+            <a:ext cx="1341689" cy="1341689"/>
+          </a:xfrm>
+          <a:prstGeom prst="rect">
+            <a:avLst/>
+          </a:prstGeom>
+          <a:noFill/>
+          <a:extLst>
+            <a:ext uri="{909E8E84-426E-40DD-AFC4-6F175D3DCCD1}">
+              <a14:hiddenFill xmlns:a14="http://schemas.microsoft.com/office/drawing/2010/main">
+                <a:solidFill>
+                  <a:srgbClr val="FFFFFF"/>
+                </a:solidFill>
+              </a14:hiddenFill>
+            </a:ext>
+          </a:extLst>
+        </p:spPr>
+      </p:pic>
+      <p:pic>
+        <p:nvPicPr>
+          <p:cNvPr id="7" name="Picture 8" descr="Image result for twitter png"/>
+          <p:cNvPicPr>
+            <a:picLocks noChangeAspect="1" noChangeArrowheads="1"/>
+          </p:cNvPicPr>
+          <p:nvPr/>
+        </p:nvPicPr>
+        <p:blipFill rotWithShape="1">
+          <a:blip r:embed="rId5">
+            <a:extLst>
+              <a:ext uri="{28A0092B-C50C-407E-A947-70E740481C1C}">
+                <a14:useLocalDpi xmlns:a14="http://schemas.microsoft.com/office/drawing/2010/main" val="0"/>
+              </a:ext>
+            </a:extLst>
+          </a:blip>
+          <a:srcRect l="4344" t="4491" r="4534" b="4387"/>
+          <a:stretch/>
+        </p:blipFill>
+        <p:spPr bwMode="auto">
+          <a:xfrm>
+            <a:off x="10201701" y="307649"/>
+            <a:ext cx="1341690" cy="1341690"/>
+          </a:xfrm>
+          <a:prstGeom prst="rect">
+            <a:avLst/>
+          </a:prstGeom>
+          <a:noFill/>
+          <a:extLst>
+            <a:ext uri="{909E8E84-426E-40DD-AFC4-6F175D3DCCD1}">
+              <a14:hiddenFill xmlns:a14="http://schemas.microsoft.com/office/drawing/2010/main">
+                <a:solidFill>
+                  <a:srgbClr val="FFFFFF"/>
+                </a:solidFill>
+              </a14:hiddenFill>
+            </a:ext>
+          </a:extLst>
+        </p:spPr>
+      </p:pic>
+      <p:pic>
+        <p:nvPicPr>
+          <p:cNvPr id="2050" name="Picture 2" descr="Image result for productivity meme"/>
+          <p:cNvPicPr>
+            <a:picLocks noChangeAspect="1" noChangeArrowheads="1"/>
+          </p:cNvPicPr>
+          <p:nvPr/>
+        </p:nvPicPr>
+        <p:blipFill>
+          <a:blip r:embed="rId6">
+            <a:extLst>
+              <a:ext uri="{28A0092B-C50C-407E-A947-70E740481C1C}">
+                <a14:useLocalDpi xmlns:a14="http://schemas.microsoft.com/office/drawing/2010/main" val="0"/>
+              </a:ext>
+            </a:extLst>
+          </a:blip>
+          <a:srcRect/>
+          <a:stretch>
+            <a:fillRect/>
+          </a:stretch>
+        </p:blipFill>
+        <p:spPr bwMode="auto">
+          <a:xfrm>
+            <a:off x="3724488" y="3345678"/>
+            <a:ext cx="5953125" cy="3343275"/>
+          </a:xfrm>
+          <a:prstGeom prst="rect">
+            <a:avLst/>
+          </a:prstGeom>
+          <a:noFill/>
+          <a:extLst>
+            <a:ext uri="{909E8E84-426E-40DD-AFC4-6F175D3DCCD1}">
+              <a14:hiddenFill xmlns:a14="http://schemas.microsoft.com/office/drawing/2010/main">
+                <a:solidFill>
+                  <a:srgbClr val="FFFFFF"/>
+                </a:solidFill>
+              </a14:hiddenFill>
+            </a:ext>
+          </a:extLst>
+        </p:spPr>
+      </p:pic>
+      <p:pic>
+        <p:nvPicPr>
+          <p:cNvPr id="2052" name="Picture 4" descr="https://i.ytimg.com/vi/J---aiyznGQ/hqdefault.jpg"/>
+          <p:cNvPicPr>
+            <a:picLocks noChangeAspect="1" noChangeArrowheads="1"/>
+          </p:cNvPicPr>
+          <p:nvPr/>
+        </p:nvPicPr>
+        <p:blipFill>
+          <a:blip r:embed="rId7">
+            <a:extLst>
+              <a:ext uri="{28A0092B-C50C-407E-A947-70E740481C1C}">
+                <a14:useLocalDpi xmlns:a14="http://schemas.microsoft.com/office/drawing/2010/main" val="0"/>
+              </a:ext>
+            </a:extLst>
+          </a:blip>
+          <a:srcRect/>
+          <a:stretch>
+            <a:fillRect/>
+          </a:stretch>
+        </p:blipFill>
+        <p:spPr bwMode="auto">
+          <a:xfrm>
+            <a:off x="3724488" y="206701"/>
+            <a:ext cx="3847032" cy="2885275"/>
+          </a:xfrm>
+          <a:prstGeom prst="rect">
+            <a:avLst/>
+          </a:prstGeom>
+          <a:noFill/>
+          <a:extLst>
+            <a:ext uri="{909E8E84-426E-40DD-AFC4-6F175D3DCCD1}">
+              <a14:hiddenFill xmlns:a14="http://schemas.microsoft.com/office/drawing/2010/main">
+                <a:solidFill>
+                  <a:srgbClr val="FFFFFF"/>
+                </a:solidFill>
+              </a14:hiddenFill>
+            </a:ext>
+          </a:extLst>
+        </p:spPr>
+      </p:pic>
+      <p:pic>
+        <p:nvPicPr>
+          <p:cNvPr id="2054" name="Picture 6" descr="Image result for solitaire microsoft icon"/>
+          <p:cNvPicPr>
+            <a:picLocks noChangeAspect="1" noChangeArrowheads="1"/>
+          </p:cNvPicPr>
+          <p:nvPr/>
+        </p:nvPicPr>
+        <p:blipFill>
+          <a:blip r:embed="rId8">
+            <a:extLst>
+              <a:ext uri="{28A0092B-C50C-407E-A947-70E740481C1C}">
+                <a14:useLocalDpi xmlns:a14="http://schemas.microsoft.com/office/drawing/2010/main" val="0"/>
+              </a:ext>
+            </a:extLst>
+          </a:blip>
+          <a:srcRect/>
+          <a:stretch>
+            <a:fillRect/>
+          </a:stretch>
+        </p:blipFill>
+        <p:spPr bwMode="auto">
+          <a:xfrm>
+            <a:off x="7898065" y="633265"/>
+            <a:ext cx="2032148" cy="2032148"/>
+          </a:xfrm>
+          <a:prstGeom prst="rect">
+            <a:avLst/>
+          </a:prstGeom>
+          <a:noFill/>
+          <a:extLst>
+            <a:ext uri="{909E8E84-426E-40DD-AFC4-6F175D3DCCD1}">
+              <a14:hiddenFill xmlns:a14="http://schemas.microsoft.com/office/drawing/2010/main">
+                <a:solidFill>
+                  <a:srgbClr val="FFFFFF"/>
+                </a:solidFill>
+              </a14:hiddenFill>
+            </a:ext>
+          </a:extLst>
+        </p:spPr>
+      </p:pic>
+      <p:pic>
+        <p:nvPicPr>
+          <p:cNvPr id="10" name="Picture 9"/>
+          <p:cNvPicPr>
+            <a:picLocks noChangeAspect="1"/>
+          </p:cNvPicPr>
+          <p:nvPr/>
+        </p:nvPicPr>
+        <p:blipFill>
+          <a:blip r:embed="rId9">
+            <a:extLst>
+              <a:ext uri="{28A0092B-C50C-407E-A947-70E740481C1C}">
+                <a14:useLocalDpi xmlns:a14="http://schemas.microsoft.com/office/drawing/2010/main" val="0"/>
+              </a:ext>
+            </a:extLst>
+          </a:blip>
+          <a:stretch>
+            <a:fillRect/>
+          </a:stretch>
+        </p:blipFill>
         <p:spPr>
           <a:xfrm>
-            <a:off x="3869268" y="864108"/>
-            <a:ext cx="7315200" cy="4571017"/>
+            <a:off x="5040362" y="1221496"/>
+            <a:ext cx="1215284" cy="855683"/>
           </a:xfrm>
+          <a:prstGeom prst="rect">
+            <a:avLst/>
+          </a:prstGeom>
         </p:spPr>
-        <p:txBody>
-          <a:bodyPr>
-            <a:noAutofit/>
-          </a:bodyPr>
-          <a:lstStyle/>
-          <a:p>
-            <a:r>
-              <a:rPr lang="en-NZ" sz="2400" dirty="0" smtClean="0"/>
-              <a:t>Medium to large sized businesses</a:t>
-            </a:r>
-          </a:p>
-          <a:p>
-            <a:r>
-              <a:rPr lang="en-NZ" sz="2400" dirty="0" smtClean="0"/>
-              <a:t>Employees that do most of their work on their computers</a:t>
-            </a:r>
-          </a:p>
-          <a:p>
-            <a:r>
-              <a:rPr lang="en-NZ" sz="2400" dirty="0" smtClean="0"/>
-              <a:t>Data entry, call centres, </a:t>
-            </a:r>
-            <a:r>
-              <a:rPr lang="en-NZ" sz="2400" dirty="0" smtClean="0"/>
-              <a:t>tech support, </a:t>
-            </a:r>
-            <a:r>
-              <a:rPr lang="en-NZ" sz="2400" dirty="0" smtClean="0"/>
-              <a:t>etc</a:t>
-            </a:r>
-            <a:r>
-              <a:rPr lang="en-NZ" sz="2400" dirty="0" smtClean="0"/>
-              <a:t>…</a:t>
-            </a:r>
-            <a:endParaRPr lang="en-NZ" sz="2400" dirty="0"/>
-          </a:p>
-          <a:p>
-            <a:endParaRPr lang="en-NZ" sz="2400" dirty="0"/>
-          </a:p>
-          <a:p>
-            <a:r>
-              <a:rPr lang="en-NZ" sz="2400" dirty="0" smtClean="0"/>
-              <a:t>Wasting time at work on social media and videos</a:t>
-            </a:r>
-            <a:endParaRPr lang="en-NZ" sz="2400" dirty="0"/>
-          </a:p>
-          <a:p>
-            <a:r>
-              <a:rPr lang="en-NZ" sz="2400" dirty="0" smtClean="0"/>
-              <a:t>Employers want to know how to </a:t>
-            </a:r>
-            <a:r>
-              <a:rPr lang="en-NZ" sz="2400" dirty="0"/>
-              <a:t>improve </a:t>
-            </a:r>
-            <a:r>
-              <a:rPr lang="en-NZ" sz="2400" dirty="0" smtClean="0"/>
-              <a:t>worker efficiency</a:t>
-            </a:r>
-            <a:endParaRPr lang="en-NZ" sz="2400" dirty="0"/>
-          </a:p>
-          <a:p>
-            <a:r>
-              <a:rPr lang="en-NZ" sz="2400" dirty="0" smtClean="0"/>
-              <a:t>Which employees are productive and which aren’t?</a:t>
-            </a:r>
-            <a:endParaRPr lang="en-NZ" sz="2400" dirty="0"/>
-          </a:p>
-        </p:txBody>
-      </p:sp>
+      </p:pic>
     </p:spTree>
     <p:extLst>
       <p:ext uri="{BB962C8B-B14F-4D97-AF65-F5344CB8AC3E}">
-        <p14:creationId xmlns:p14="http://schemas.microsoft.com/office/powerpoint/2010/main" val="554901423"/>
+        <p14:creationId xmlns:p14="http://schemas.microsoft.com/office/powerpoint/2010/main" val="3045101305"/>
       </p:ext>
     </p:extLst>
   </p:cSld>
   <p:clrMapOvr>
     <a:masterClrMapping/>
   </p:clrMapOvr>
-  <p:timing>
-    <p:tnLst>
-      <p:par>
-        <p:cTn id="1" dur="indefinite" restart="never" nodeType="tmRoot"/>
-      </p:par>
-    </p:tnLst>
-  </p:timing>
 </p:sld>
 </file>
 
@@ -4058,49 +4086,6 @@
         <p:txBody>
           <a:bodyPr/>
           <a:lstStyle/>
-          <a:p>
-            <a:r>
-              <a:rPr lang="en-NZ" sz="2400" dirty="0" smtClean="0"/>
-              <a:t>Track application and web </a:t>
-            </a:r>
-            <a:r>
-              <a:rPr lang="en-NZ" sz="2400" dirty="0"/>
-              <a:t>usage</a:t>
-            </a:r>
-          </a:p>
-          <a:p>
-            <a:r>
-              <a:rPr lang="en-NZ" sz="2400" dirty="0"/>
-              <a:t>Display statistics and graphs </a:t>
-            </a:r>
-            <a:endParaRPr lang="en-NZ" sz="2400" dirty="0" smtClean="0"/>
-          </a:p>
-          <a:p>
-            <a:r>
-              <a:rPr lang="en-NZ" sz="2400" dirty="0" smtClean="0"/>
-              <a:t>Compare usage</a:t>
-            </a:r>
-          </a:p>
-          <a:p>
-            <a:endParaRPr lang="en-NZ" sz="2400" dirty="0"/>
-          </a:p>
-          <a:p>
-            <a:r>
-              <a:rPr lang="en-NZ" sz="2400" dirty="0" smtClean="0"/>
-              <a:t>System tray </a:t>
-            </a:r>
-            <a:r>
-              <a:rPr lang="en-NZ" sz="2400" dirty="0"/>
-              <a:t>application which starts with Windows</a:t>
-            </a:r>
-          </a:p>
-          <a:p>
-            <a:r>
-              <a:rPr lang="en-NZ" sz="2400" dirty="0" smtClean="0"/>
-              <a:t>Client app on both mobile and Windows (Xamarin)</a:t>
-            </a:r>
-            <a:endParaRPr lang="en-NZ" sz="2400" dirty="0"/>
-          </a:p>
           <a:p>
             <a:endParaRPr lang="en-NZ" dirty="0"/>
           </a:p>
@@ -4160,7 +4145,7 @@
           <a:p>
             <a:r>
               <a:rPr lang="en-NZ" dirty="0" smtClean="0"/>
-              <a:t>Technical Aspects</a:t>
+              <a:t>Technology	</a:t>
             </a:r>
             <a:endParaRPr lang="en-NZ" dirty="0"/>
           </a:p>
@@ -4184,7 +4169,7 @@
         </p:spPr>
         <p:txBody>
           <a:bodyPr>
-            <a:normAutofit lnSpcReduction="10000"/>
+            <a:normAutofit/>
           </a:bodyPr>
           <a:lstStyle/>
           <a:p>
@@ -4192,73 +4177,6 @@
           </a:p>
           <a:p>
             <a:endParaRPr lang="en-NZ" dirty="0"/>
-          </a:p>
-          <a:p>
-            <a:pPr marL="0" indent="0">
-              <a:buNone/>
-            </a:pPr>
-            <a:endParaRPr lang="en-NZ" dirty="0" smtClean="0"/>
-          </a:p>
-          <a:p>
-            <a:r>
-              <a:rPr lang="en-NZ" sz="2400" dirty="0" smtClean="0"/>
-              <a:t>Windows </a:t>
-            </a:r>
-            <a:r>
-              <a:rPr lang="en-NZ" sz="2400" dirty="0" smtClean="0"/>
-              <a:t>forms </a:t>
-            </a:r>
-            <a:r>
-              <a:rPr lang="en-NZ" sz="2400" dirty="0" smtClean="0"/>
-              <a:t>application + Mobile/Windows App</a:t>
-            </a:r>
-          </a:p>
-          <a:p>
-            <a:endParaRPr lang="en-NZ" sz="2400" dirty="0"/>
-          </a:p>
-          <a:p>
-            <a:r>
-              <a:rPr lang="en-NZ" sz="2400" dirty="0" err="1" smtClean="0"/>
-              <a:t>WorkTime</a:t>
-            </a:r>
-            <a:r>
-              <a:rPr lang="en-NZ" sz="2400" dirty="0" smtClean="0"/>
-              <a:t> already exists</a:t>
-            </a:r>
-          </a:p>
-          <a:p>
-            <a:r>
-              <a:rPr lang="en-NZ" sz="2400" dirty="0" smtClean="0"/>
-              <a:t>Our unique features:</a:t>
-            </a:r>
-          </a:p>
-          <a:p>
-            <a:pPr lvl="1"/>
-            <a:r>
-              <a:rPr lang="en-NZ" sz="2100" dirty="0" smtClean="0"/>
-              <a:t>Outlook Integration (Tasks/Meetings/Deadlines)</a:t>
-            </a:r>
-          </a:p>
-          <a:p>
-            <a:pPr lvl="1"/>
-            <a:r>
-              <a:rPr lang="en-NZ" sz="2100" dirty="0" smtClean="0"/>
-              <a:t>Much more modern UI</a:t>
-            </a:r>
-          </a:p>
-          <a:p>
-            <a:pPr lvl="1"/>
-            <a:r>
-              <a:rPr lang="en-NZ" sz="2100" dirty="0" smtClean="0"/>
-              <a:t>More Analytics – Weekly/Monthly/Yearly trends</a:t>
-            </a:r>
-          </a:p>
-          <a:p>
-            <a:pPr lvl="1"/>
-            <a:r>
-              <a:rPr lang="en-NZ" sz="2100" dirty="0" smtClean="0"/>
-              <a:t>Positive reinforcement rewards system</a:t>
-            </a:r>
           </a:p>
           <a:p>
             <a:pPr lvl="1"/>
@@ -4446,73 +4364,42 @@
           <a:lstStyle/>
           <a:p>
             <a:r>
-              <a:rPr lang="en-NZ" dirty="0"/>
-              <a:t>Visual Design I</a:t>
-            </a:r>
-          </a:p>
-        </p:txBody>
-      </p:sp>
-      <p:sp>
-        <p:nvSpPr>
-          <p:cNvPr id="4" name="Text Placeholder 3"/>
-          <p:cNvSpPr>
-            <a:spLocks noGrp="1"/>
-          </p:cNvSpPr>
-          <p:nvPr>
-            <p:ph type="body" sz="half" idx="2"/>
-          </p:nvPr>
-        </p:nvSpPr>
-        <p:spPr/>
-        <p:txBody>
-          <a:bodyPr/>
-          <a:lstStyle/>
-          <a:p>
+              <a:rPr lang="en-NZ" dirty="0" smtClean="0"/>
+              <a:t>Technology II</a:t>
+            </a:r>
             <a:endParaRPr lang="en-NZ" dirty="0"/>
           </a:p>
         </p:txBody>
       </p:sp>
-      <p:pic>
-        <p:nvPicPr>
-          <p:cNvPr id="10" name="Picture Placeholder 9"/>
-          <p:cNvPicPr>
-            <a:picLocks noGrp="1" noChangeAspect="1"/>
-          </p:cNvPicPr>
-          <p:nvPr>
-            <p:ph type="pic" idx="1"/>
-          </p:nvPr>
-        </p:nvPicPr>
-        <p:blipFill>
-          <a:blip r:embed="rId2">
-            <a:extLst>
-              <a:ext uri="{28A0092B-C50C-407E-A947-70E740481C1C}">
-                <a14:useLocalDpi xmlns:a14="http://schemas.microsoft.com/office/drawing/2010/main" val="0"/>
-              </a:ext>
-            </a:extLst>
-          </a:blip>
-          <a:srcRect l="10" r="10"/>
-          <a:stretch>
-            <a:fillRect/>
-          </a:stretch>
-        </p:blipFill>
-        <p:spPr/>
-      </p:pic>
+      <p:sp>
+        <p:nvSpPr>
+          <p:cNvPr id="3" name="Content Placeholder 2"/>
+          <p:cNvSpPr>
+            <a:spLocks noGrp="1"/>
+          </p:cNvSpPr>
+          <p:nvPr>
+            <p:ph idx="1"/>
+          </p:nvPr>
+        </p:nvSpPr>
+        <p:spPr/>
+        <p:txBody>
+          <a:bodyPr/>
+          <a:lstStyle/>
+          <a:p>
+            <a:endParaRPr lang="en-NZ"/>
+          </a:p>
+        </p:txBody>
+      </p:sp>
     </p:spTree>
     <p:extLst>
       <p:ext uri="{BB962C8B-B14F-4D97-AF65-F5344CB8AC3E}">
-        <p14:creationId xmlns:p14="http://schemas.microsoft.com/office/powerpoint/2010/main" val="4125832614"/>
+        <p14:creationId xmlns:p14="http://schemas.microsoft.com/office/powerpoint/2010/main" val="1495743765"/>
       </p:ext>
     </p:extLst>
   </p:cSld>
   <p:clrMapOvr>
     <a:masterClrMapping/>
   </p:clrMapOvr>
-  <p:timing>
-    <p:tnLst>
-      <p:par>
-        <p:cTn id="1" dur="indefinite" restart="never" nodeType="tmRoot"/>
-      </p:par>
-    </p:tnLst>
-  </p:timing>
 </p:sld>
 </file>
 
@@ -4550,71 +4437,41 @@
           <a:p>
             <a:r>
               <a:rPr lang="en-NZ" dirty="0" smtClean="0"/>
-              <a:t>Database</a:t>
+              <a:t>Market Research</a:t>
             </a:r>
             <a:endParaRPr lang="en-NZ" dirty="0"/>
           </a:p>
         </p:txBody>
       </p:sp>
-      <p:pic>
-        <p:nvPicPr>
-          <p:cNvPr id="6" name="Picture Placeholder 5"/>
-          <p:cNvPicPr>
-            <a:picLocks noGrp="1" noChangeAspect="1"/>
-          </p:cNvPicPr>
-          <p:nvPr>
-            <p:ph type="pic" idx="1"/>
-          </p:nvPr>
-        </p:nvPicPr>
-        <p:blipFill>
-          <a:blip r:embed="rId2"/>
-          <a:srcRect l="4249" r="4249"/>
-          <a:stretch>
-            <a:fillRect/>
-          </a:stretch>
-        </p:blipFill>
-        <p:spPr>
-          <a:prstGeom prst="rect">
-            <a:avLst/>
-          </a:prstGeom>
-        </p:spPr>
-      </p:pic>
-      <p:sp>
-        <p:nvSpPr>
-          <p:cNvPr id="4" name="Text Placeholder 3"/>
-          <p:cNvSpPr>
-            <a:spLocks noGrp="1"/>
-          </p:cNvSpPr>
-          <p:nvPr>
-            <p:ph type="body" sz="half" idx="2"/>
-          </p:nvPr>
-        </p:nvSpPr>
-        <p:spPr/>
-        <p:txBody>
-          <a:bodyPr/>
-          <a:lstStyle/>
-          <a:p>
-            <a:endParaRPr lang="en-NZ"/>
+      <p:sp>
+        <p:nvSpPr>
+          <p:cNvPr id="3" name="Content Placeholder 2"/>
+          <p:cNvSpPr>
+            <a:spLocks noGrp="1"/>
+          </p:cNvSpPr>
+          <p:nvPr>
+            <p:ph idx="1"/>
+          </p:nvPr>
+        </p:nvSpPr>
+        <p:spPr/>
+        <p:txBody>
+          <a:bodyPr/>
+          <a:lstStyle/>
+          <a:p>
+            <a:endParaRPr lang="en-NZ" dirty="0"/>
           </a:p>
         </p:txBody>
       </p:sp>
     </p:spTree>
     <p:extLst>
       <p:ext uri="{BB962C8B-B14F-4D97-AF65-F5344CB8AC3E}">
-        <p14:creationId xmlns:p14="http://schemas.microsoft.com/office/powerpoint/2010/main" val="3276679459"/>
+        <p14:creationId xmlns:p14="http://schemas.microsoft.com/office/powerpoint/2010/main" val="1580280769"/>
       </p:ext>
     </p:extLst>
   </p:cSld>
   <p:clrMapOvr>
     <a:masterClrMapping/>
   </p:clrMapOvr>
-  <p:timing>
-    <p:tnLst>
-      <p:par>
-        <p:cTn id="1" dur="indefinite" restart="never" nodeType="tmRoot"/>
-      </p:par>
-    </p:tnLst>
-  </p:timing>
 </p:sld>
 </file>
 
@@ -4651,73 +4508,42 @@
           <a:lstStyle/>
           <a:p>
             <a:r>
-              <a:rPr lang="en-NZ" dirty="0"/>
-              <a:t>Visual Design II</a:t>
-            </a:r>
-          </a:p>
-        </p:txBody>
-      </p:sp>
-      <p:sp>
-        <p:nvSpPr>
-          <p:cNvPr id="4" name="Text Placeholder 3"/>
-          <p:cNvSpPr>
-            <a:spLocks noGrp="1"/>
-          </p:cNvSpPr>
-          <p:nvPr>
-            <p:ph type="body" sz="half" idx="2"/>
-          </p:nvPr>
-        </p:nvSpPr>
-        <p:spPr/>
-        <p:txBody>
-          <a:bodyPr/>
-          <a:lstStyle/>
-          <a:p>
+              <a:rPr lang="en-NZ" dirty="0" smtClean="0"/>
+              <a:t>Unique Solution</a:t>
+            </a:r>
             <a:endParaRPr lang="en-NZ" dirty="0"/>
           </a:p>
         </p:txBody>
       </p:sp>
-      <p:pic>
-        <p:nvPicPr>
-          <p:cNvPr id="8" name="Picture Placeholder 7"/>
-          <p:cNvPicPr>
-            <a:picLocks noGrp="1" noChangeAspect="1"/>
-          </p:cNvPicPr>
-          <p:nvPr>
-            <p:ph type="pic" idx="1"/>
-          </p:nvPr>
-        </p:nvPicPr>
-        <p:blipFill>
-          <a:blip r:embed="rId2">
-            <a:extLst>
-              <a:ext uri="{28A0092B-C50C-407E-A947-70E740481C1C}">
-                <a14:useLocalDpi xmlns:a14="http://schemas.microsoft.com/office/drawing/2010/main" val="0"/>
-              </a:ext>
-            </a:extLst>
-          </a:blip>
-          <a:srcRect l="18" r="18"/>
-          <a:stretch>
-            <a:fillRect/>
-          </a:stretch>
-        </p:blipFill>
-        <p:spPr/>
-      </p:pic>
+      <p:sp>
+        <p:nvSpPr>
+          <p:cNvPr id="3" name="Content Placeholder 2"/>
+          <p:cNvSpPr>
+            <a:spLocks noGrp="1"/>
+          </p:cNvSpPr>
+          <p:nvPr>
+            <p:ph idx="1"/>
+          </p:nvPr>
+        </p:nvSpPr>
+        <p:spPr/>
+        <p:txBody>
+          <a:bodyPr/>
+          <a:lstStyle/>
+          <a:p>
+            <a:endParaRPr lang="en-NZ"/>
+          </a:p>
+        </p:txBody>
+      </p:sp>
     </p:spTree>
     <p:extLst>
       <p:ext uri="{BB962C8B-B14F-4D97-AF65-F5344CB8AC3E}">
-        <p14:creationId xmlns:p14="http://schemas.microsoft.com/office/powerpoint/2010/main" val="3048752527"/>
+        <p14:creationId xmlns:p14="http://schemas.microsoft.com/office/powerpoint/2010/main" val="1831439618"/>
       </p:ext>
     </p:extLst>
   </p:cSld>
   <p:clrMapOvr>
     <a:masterClrMapping/>
   </p:clrMapOvr>
-  <p:timing>
-    <p:tnLst>
-      <p:par>
-        <p:cTn id="1" dur="indefinite" restart="never" nodeType="tmRoot"/>
-      </p:par>
-    </p:tnLst>
-  </p:timing>
 </p:sld>
 </file>
 
@@ -4754,9 +4580,10 @@
           <a:lstStyle/>
           <a:p>
             <a:r>
-              <a:rPr lang="en-NZ" dirty="0"/>
-              <a:t>Conclusions</a:t>
-            </a:r>
+              <a:rPr lang="en-NZ" dirty="0" smtClean="0"/>
+              <a:t>References</a:t>
+            </a:r>
+            <a:endParaRPr lang="en-NZ" dirty="0"/>
           </a:p>
         </p:txBody>
       </p:sp>
@@ -4770,62 +4597,24 @@
             <p:ph idx="1"/>
           </p:nvPr>
         </p:nvSpPr>
-        <p:spPr>
-          <a:xfrm>
-            <a:off x="3869268" y="1888620"/>
-            <a:ext cx="7315200" cy="4096127"/>
-          </a:xfrm>
-        </p:spPr>
-        <p:txBody>
-          <a:bodyPr/>
-          <a:lstStyle/>
-          <a:p>
-            <a:r>
-              <a:rPr lang="en-NZ" sz="2400" dirty="0" smtClean="0"/>
-              <a:t>Employers want more efficiency</a:t>
-            </a:r>
-            <a:endParaRPr lang="en-NZ" sz="2400" dirty="0" smtClean="0"/>
-          </a:p>
-          <a:p>
-            <a:endParaRPr lang="en-NZ" sz="2400" dirty="0"/>
-          </a:p>
-          <a:p>
-            <a:r>
-              <a:rPr lang="en-NZ" sz="2400" dirty="0"/>
-              <a:t>Timekeeper will track usage of applications </a:t>
-            </a:r>
-            <a:endParaRPr lang="en-NZ" sz="2400" dirty="0" smtClean="0"/>
-          </a:p>
-          <a:p>
-            <a:endParaRPr lang="en-NZ" sz="2400" dirty="0" smtClean="0"/>
-          </a:p>
-          <a:p>
-            <a:r>
-              <a:rPr lang="en-NZ" sz="2400" dirty="0" smtClean="0"/>
-              <a:t>Rank employees by usage, rank applications by usage</a:t>
-            </a:r>
-            <a:endParaRPr lang="en-NZ" sz="2400" dirty="0" smtClean="0"/>
-          </a:p>
-          <a:p>
-            <a:endParaRPr lang="en-NZ" sz="2400" dirty="0"/>
-          </a:p>
-          <a:p>
-            <a:r>
-              <a:rPr lang="en-NZ" sz="2400" dirty="0" smtClean="0"/>
-              <a:t>Employers can identify problem applications, websites, and workers</a:t>
-            </a:r>
-            <a:endParaRPr lang="en-NZ" sz="2400" dirty="0"/>
-          </a:p>
-          <a:p>
-            <a:pPr lvl="1"/>
-            <a:endParaRPr lang="en-NZ" dirty="0"/>
-          </a:p>
-          <a:p>
-            <a:pPr lvl="1"/>
-            <a:endParaRPr lang="en-NZ" dirty="0"/>
-          </a:p>
-          <a:p>
-            <a:endParaRPr lang="en-NZ" dirty="0"/>
+        <p:spPr/>
+        <p:txBody>
+          <a:bodyPr/>
+          <a:lstStyle/>
+          <a:p>
+            <a:r>
+              <a:rPr lang="en-NZ" dirty="0">
+                <a:hlinkClick r:id="rId2"/>
+              </a:rPr>
+              <a:t>http://</a:t>
+            </a:r>
+            <a:r>
+              <a:rPr lang="en-NZ" dirty="0" smtClean="0">
+                <a:hlinkClick r:id="rId2"/>
+              </a:rPr>
+              <a:t>www.productivity.govt.nz/blog/how-does-nz%E2%80%99s-productivity-performance-stack-up</a:t>
+            </a:r>
+            <a:endParaRPr lang="en-NZ" dirty="0" smtClean="0"/>
           </a:p>
           <a:p>
             <a:endParaRPr lang="en-NZ" dirty="0"/>
@@ -4835,20 +4624,13 @@
     </p:spTree>
     <p:extLst>
       <p:ext uri="{BB962C8B-B14F-4D97-AF65-F5344CB8AC3E}">
-        <p14:creationId xmlns:p14="http://schemas.microsoft.com/office/powerpoint/2010/main" val="3942591288"/>
+        <p14:creationId xmlns:p14="http://schemas.microsoft.com/office/powerpoint/2010/main" val="2534010642"/>
       </p:ext>
     </p:extLst>
   </p:cSld>
   <p:clrMapOvr>
     <a:masterClrMapping/>
   </p:clrMapOvr>
-  <p:timing>
-    <p:tnLst>
-      <p:par>
-        <p:cTn id="1" dur="indefinite" restart="never" nodeType="tmRoot"/>
-      </p:par>
-    </p:tnLst>
-  </p:timing>
 </p:sld>
 </file>
 

</xml_diff>

<commit_message>
further updates to presentation and script
</commit_message>
<xml_diff>
--- a/Planning/Timekeeper.pptx
+++ b/Planning/Timekeeper.pptx
@@ -9,10 +9,10 @@
     <p:sldId id="257" r:id="rId3"/>
     <p:sldId id="267" r:id="rId4"/>
     <p:sldId id="258" r:id="rId5"/>
-    <p:sldId id="262" r:id="rId6"/>
-    <p:sldId id="264" r:id="rId7"/>
-    <p:sldId id="263" r:id="rId8"/>
-    <p:sldId id="265" r:id="rId9"/>
+    <p:sldId id="263" r:id="rId6"/>
+    <p:sldId id="268" r:id="rId7"/>
+    <p:sldId id="262" r:id="rId8"/>
+    <p:sldId id="264" r:id="rId9"/>
     <p:sldId id="266" r:id="rId10"/>
   </p:sldIdLst>
   <p:sldSz cx="12192000" cy="6858000"/>
@@ -4087,10 +4087,108 @@
           <a:bodyPr/>
           <a:lstStyle/>
           <a:p>
+            <a:r>
+              <a:rPr lang="en-NZ" dirty="0" smtClean="0"/>
+              <a:t>System tracking software installed on employee workstation</a:t>
+            </a:r>
+          </a:p>
+          <a:p>
+            <a:r>
+              <a:rPr lang="en-NZ" dirty="0" smtClean="0"/>
+              <a:t>Determine the current active window over time</a:t>
+            </a:r>
+          </a:p>
+          <a:p>
+            <a:r>
+              <a:rPr lang="en-NZ" dirty="0" smtClean="0"/>
+              <a:t>Track trends in worker productivity</a:t>
+            </a:r>
+          </a:p>
+          <a:p>
+            <a:endParaRPr lang="en-NZ" dirty="0" smtClean="0"/>
+          </a:p>
+          <a:p>
+            <a:r>
+              <a:rPr lang="en-NZ" dirty="0" smtClean="0"/>
+              <a:t>Supervisor views mobile / windows cross platform application </a:t>
+            </a:r>
             <a:endParaRPr lang="en-NZ" dirty="0"/>
           </a:p>
-        </p:txBody>
-      </p:sp>
+          <a:p>
+            <a:r>
+              <a:rPr lang="en-NZ" dirty="0"/>
+              <a:t>C</a:t>
+            </a:r>
+            <a:r>
+              <a:rPr lang="en-NZ" dirty="0" smtClean="0"/>
+              <a:t>an set classifications for applications and websites</a:t>
+            </a:r>
+          </a:p>
+          <a:p>
+            <a:r>
+              <a:rPr lang="en-NZ" dirty="0" smtClean="0"/>
+              <a:t>Choose to set names or not</a:t>
+            </a:r>
+            <a:endParaRPr lang="en-NZ" dirty="0"/>
+          </a:p>
+          <a:p>
+            <a:r>
+              <a:rPr lang="en-NZ" dirty="0" smtClean="0"/>
+              <a:t>Allows supervisors to tailor plans to workplace productivity trends</a:t>
+            </a:r>
+          </a:p>
+          <a:p>
+            <a:endParaRPr lang="en-NZ" dirty="0" smtClean="0"/>
+          </a:p>
+          <a:p>
+            <a:endParaRPr lang="en-NZ" dirty="0" smtClean="0"/>
+          </a:p>
+          <a:p>
+            <a:endParaRPr lang="en-NZ" dirty="0" smtClean="0"/>
+          </a:p>
+        </p:txBody>
+      </p:sp>
+      <p:pic>
+        <p:nvPicPr>
+          <p:cNvPr id="3074" name="Picture 2" descr="http://www.clipartbest.com/cliparts/Rcd/6dr/Rcd6drMXi.gif"/>
+          <p:cNvPicPr>
+            <a:picLocks noChangeAspect="1" noChangeArrowheads="1"/>
+          </p:cNvPicPr>
+          <p:nvPr/>
+        </p:nvPicPr>
+        <p:blipFill>
+          <a:blip r:embed="rId2">
+            <a:extLst>
+              <a:ext uri="{28A0092B-C50C-407E-A947-70E740481C1C}">
+                <a14:useLocalDpi xmlns:a14="http://schemas.microsoft.com/office/drawing/2010/main" val="0"/>
+              </a:ext>
+            </a:extLst>
+          </a:blip>
+          <a:srcRect/>
+          <a:stretch>
+            <a:fillRect/>
+          </a:stretch>
+        </p:blipFill>
+        <p:spPr bwMode="auto">
+          <a:xfrm>
+            <a:off x="6640122" y="4571138"/>
+            <a:ext cx="2102225" cy="2160917"/>
+          </a:xfrm>
+          <a:prstGeom prst="rect">
+            <a:avLst/>
+          </a:prstGeom>
+          <a:noFill/>
+          <a:extLst>
+            <a:ext uri="{909E8E84-426E-40DD-AFC4-6F175D3DCCD1}">
+              <a14:hiddenFill xmlns:a14="http://schemas.microsoft.com/office/drawing/2010/main">
+                <a:solidFill>
+                  <a:srgbClr val="FFFFFF"/>
+                </a:solidFill>
+              </a14:hiddenFill>
+            </a:ext>
+          </a:extLst>
+        </p:spPr>
+      </p:pic>
     </p:spTree>
     <p:extLst>
       <p:ext uri="{BB962C8B-B14F-4D97-AF65-F5344CB8AC3E}">
@@ -4112,6 +4210,241 @@
 </file>
 
 <file path=ppt/slides/slide5.xml><?xml version="1.0" encoding="utf-8"?>
+<p:sld xmlns:a="http://schemas.openxmlformats.org/drawingml/2006/main" xmlns:r="http://schemas.openxmlformats.org/officeDocument/2006/relationships" xmlns:p="http://schemas.openxmlformats.org/presentationml/2006/main">
+  <p:cSld>
+    <p:spTree>
+      <p:nvGrpSpPr>
+        <p:cNvPr id="1" name=""/>
+        <p:cNvGrpSpPr/>
+        <p:nvPr/>
+      </p:nvGrpSpPr>
+      <p:grpSpPr>
+        <a:xfrm>
+          <a:off x="0" y="0"/>
+          <a:ext cx="0" cy="0"/>
+          <a:chOff x="0" y="0"/>
+          <a:chExt cx="0" cy="0"/>
+        </a:xfrm>
+      </p:grpSpPr>
+      <p:sp>
+        <p:nvSpPr>
+          <p:cNvPr id="2" name="Title 1"/>
+          <p:cNvSpPr>
+            <a:spLocks noGrp="1"/>
+          </p:cNvSpPr>
+          <p:nvPr>
+            <p:ph type="title"/>
+          </p:nvPr>
+        </p:nvSpPr>
+        <p:spPr/>
+        <p:txBody>
+          <a:bodyPr/>
+          <a:lstStyle/>
+          <a:p>
+            <a:r>
+              <a:rPr lang="en-NZ" dirty="0" smtClean="0"/>
+              <a:t>Market Research</a:t>
+            </a:r>
+            <a:endParaRPr lang="en-NZ" dirty="0"/>
+          </a:p>
+        </p:txBody>
+      </p:sp>
+      <p:sp>
+        <p:nvSpPr>
+          <p:cNvPr id="3" name="Content Placeholder 2"/>
+          <p:cNvSpPr>
+            <a:spLocks noGrp="1"/>
+          </p:cNvSpPr>
+          <p:nvPr>
+            <p:ph idx="1"/>
+          </p:nvPr>
+        </p:nvSpPr>
+        <p:spPr>
+          <a:xfrm>
+            <a:off x="3869267" y="427289"/>
+            <a:ext cx="7315200" cy="6349525"/>
+          </a:xfrm>
+        </p:spPr>
+        <p:txBody>
+          <a:bodyPr/>
+          <a:lstStyle/>
+          <a:p>
+            <a:r>
+              <a:rPr lang="en-NZ" dirty="0" smtClean="0"/>
+              <a:t>Main competitor: Existing product called </a:t>
+            </a:r>
+            <a:r>
+              <a:rPr lang="en-NZ" dirty="0" err="1" smtClean="0"/>
+              <a:t>WorkTime</a:t>
+            </a:r>
+            <a:endParaRPr lang="en-NZ" dirty="0" smtClean="0"/>
+          </a:p>
+          <a:p>
+            <a:endParaRPr lang="en-NZ" dirty="0" smtClean="0"/>
+          </a:p>
+          <a:p>
+            <a:endParaRPr lang="en-NZ" dirty="0"/>
+          </a:p>
+          <a:p>
+            <a:endParaRPr lang="en-NZ" dirty="0" smtClean="0"/>
+          </a:p>
+          <a:p>
+            <a:endParaRPr lang="en-NZ" dirty="0"/>
+          </a:p>
+          <a:p>
+            <a:endParaRPr lang="en-NZ" dirty="0" smtClean="0"/>
+          </a:p>
+          <a:p>
+            <a:pPr marL="0" indent="0">
+              <a:buNone/>
+            </a:pPr>
+            <a:endParaRPr lang="en-NZ" dirty="0"/>
+          </a:p>
+          <a:p>
+            <a:r>
+              <a:rPr lang="en-NZ" dirty="0" smtClean="0"/>
+              <a:t>Timekeeper will have a more modern and easier to view UI</a:t>
+            </a:r>
+          </a:p>
+          <a:p>
+            <a:r>
+              <a:rPr lang="en-NZ" dirty="0" smtClean="0"/>
+              <a:t>Less invasive</a:t>
+            </a:r>
+          </a:p>
+          <a:p>
+            <a:r>
+              <a:rPr lang="en-NZ" dirty="0" smtClean="0"/>
+              <a:t>More company wide productivity trends and graphs</a:t>
+            </a:r>
+          </a:p>
+          <a:p>
+            <a:r>
+              <a:rPr lang="en-NZ" dirty="0" smtClean="0"/>
+              <a:t>More outcome focussed</a:t>
+            </a:r>
+          </a:p>
+          <a:p>
+            <a:r>
+              <a:rPr lang="en-NZ" dirty="0" smtClean="0"/>
+              <a:t>Aimed at helping supervisors to plan for improvement, rather than simply showing real time and past statistics</a:t>
+            </a:r>
+          </a:p>
+          <a:p>
+            <a:endParaRPr lang="en-NZ" dirty="0"/>
+          </a:p>
+        </p:txBody>
+      </p:sp>
+      <p:pic>
+        <p:nvPicPr>
+          <p:cNvPr id="4" name="Picture 3"/>
+          <p:cNvPicPr>
+            <a:picLocks noChangeAspect="1"/>
+          </p:cNvPicPr>
+          <p:nvPr/>
+        </p:nvPicPr>
+        <p:blipFill>
+          <a:blip r:embed="rId2"/>
+          <a:stretch>
+            <a:fillRect/>
+          </a:stretch>
+        </p:blipFill>
+        <p:spPr>
+          <a:xfrm>
+            <a:off x="5505736" y="1184843"/>
+            <a:ext cx="4042263" cy="2485575"/>
+          </a:xfrm>
+          <a:prstGeom prst="rect">
+            <a:avLst/>
+          </a:prstGeom>
+        </p:spPr>
+      </p:pic>
+    </p:spTree>
+    <p:extLst>
+      <p:ext uri="{BB962C8B-B14F-4D97-AF65-F5344CB8AC3E}">
+        <p14:creationId xmlns:p14="http://schemas.microsoft.com/office/powerpoint/2010/main" val="1580280769"/>
+      </p:ext>
+    </p:extLst>
+  </p:cSld>
+  <p:clrMapOvr>
+    <a:masterClrMapping/>
+  </p:clrMapOvr>
+</p:sld>
+</file>
+
+<file path=ppt/slides/slide6.xml><?xml version="1.0" encoding="utf-8"?>
+<p:sld xmlns:a="http://schemas.openxmlformats.org/drawingml/2006/main" xmlns:r="http://schemas.openxmlformats.org/officeDocument/2006/relationships" xmlns:p="http://schemas.openxmlformats.org/presentationml/2006/main">
+  <p:cSld>
+    <p:spTree>
+      <p:nvGrpSpPr>
+        <p:cNvPr id="1" name=""/>
+        <p:cNvGrpSpPr/>
+        <p:nvPr/>
+      </p:nvGrpSpPr>
+      <p:grpSpPr>
+        <a:xfrm>
+          <a:off x="0" y="0"/>
+          <a:ext cx="0" cy="0"/>
+          <a:chOff x="0" y="0"/>
+          <a:chExt cx="0" cy="0"/>
+        </a:xfrm>
+      </p:grpSpPr>
+      <p:sp>
+        <p:nvSpPr>
+          <p:cNvPr id="2" name="Title 1"/>
+          <p:cNvSpPr>
+            <a:spLocks noGrp="1"/>
+          </p:cNvSpPr>
+          <p:nvPr>
+            <p:ph type="title"/>
+          </p:nvPr>
+        </p:nvSpPr>
+        <p:spPr/>
+        <p:txBody>
+          <a:bodyPr/>
+          <a:lstStyle/>
+          <a:p>
+            <a:r>
+              <a:rPr lang="en-NZ" dirty="0" smtClean="0"/>
+              <a:t>Business Model</a:t>
+            </a:r>
+            <a:endParaRPr lang="en-NZ" dirty="0"/>
+          </a:p>
+        </p:txBody>
+      </p:sp>
+      <p:sp>
+        <p:nvSpPr>
+          <p:cNvPr id="3" name="Content Placeholder 2"/>
+          <p:cNvSpPr>
+            <a:spLocks noGrp="1"/>
+          </p:cNvSpPr>
+          <p:nvPr>
+            <p:ph idx="1"/>
+          </p:nvPr>
+        </p:nvSpPr>
+        <p:spPr/>
+        <p:txBody>
+          <a:bodyPr/>
+          <a:lstStyle/>
+          <a:p>
+            <a:endParaRPr lang="en-NZ" dirty="0"/>
+          </a:p>
+        </p:txBody>
+      </p:sp>
+    </p:spTree>
+    <p:extLst>
+      <p:ext uri="{BB962C8B-B14F-4D97-AF65-F5344CB8AC3E}">
+        <p14:creationId xmlns:p14="http://schemas.microsoft.com/office/powerpoint/2010/main" val="1956563519"/>
+      </p:ext>
+    </p:extLst>
+  </p:cSld>
+  <p:clrMapOvr>
+    <a:masterClrMapping/>
+  </p:clrMapOvr>
+</p:sld>
+</file>
+
+<file path=ppt/slides/slide7.xml><?xml version="1.0" encoding="utf-8"?>
 <p:sld xmlns:a="http://schemas.openxmlformats.org/drawingml/2006/main" xmlns:r="http://schemas.openxmlformats.org/officeDocument/2006/relationships" xmlns:p="http://schemas.openxmlformats.org/presentationml/2006/main">
   <p:cSld>
     <p:spTree>
@@ -4331,150 +4664,6 @@
 </p:sld>
 </file>
 
-<file path=ppt/slides/slide6.xml><?xml version="1.0" encoding="utf-8"?>
-<p:sld xmlns:a="http://schemas.openxmlformats.org/drawingml/2006/main" xmlns:r="http://schemas.openxmlformats.org/officeDocument/2006/relationships" xmlns:p="http://schemas.openxmlformats.org/presentationml/2006/main">
-  <p:cSld>
-    <p:spTree>
-      <p:nvGrpSpPr>
-        <p:cNvPr id="1" name=""/>
-        <p:cNvGrpSpPr/>
-        <p:nvPr/>
-      </p:nvGrpSpPr>
-      <p:grpSpPr>
-        <a:xfrm>
-          <a:off x="0" y="0"/>
-          <a:ext cx="0" cy="0"/>
-          <a:chOff x="0" y="0"/>
-          <a:chExt cx="0" cy="0"/>
-        </a:xfrm>
-      </p:grpSpPr>
-      <p:sp>
-        <p:nvSpPr>
-          <p:cNvPr id="2" name="Title 1"/>
-          <p:cNvSpPr>
-            <a:spLocks noGrp="1"/>
-          </p:cNvSpPr>
-          <p:nvPr>
-            <p:ph type="title"/>
-          </p:nvPr>
-        </p:nvSpPr>
-        <p:spPr/>
-        <p:txBody>
-          <a:bodyPr/>
-          <a:lstStyle/>
-          <a:p>
-            <a:r>
-              <a:rPr lang="en-NZ" dirty="0" smtClean="0"/>
-              <a:t>Technology II</a:t>
-            </a:r>
-            <a:endParaRPr lang="en-NZ" dirty="0"/>
-          </a:p>
-        </p:txBody>
-      </p:sp>
-      <p:sp>
-        <p:nvSpPr>
-          <p:cNvPr id="3" name="Content Placeholder 2"/>
-          <p:cNvSpPr>
-            <a:spLocks noGrp="1"/>
-          </p:cNvSpPr>
-          <p:nvPr>
-            <p:ph idx="1"/>
-          </p:nvPr>
-        </p:nvSpPr>
-        <p:spPr/>
-        <p:txBody>
-          <a:bodyPr/>
-          <a:lstStyle/>
-          <a:p>
-            <a:endParaRPr lang="en-NZ"/>
-          </a:p>
-        </p:txBody>
-      </p:sp>
-    </p:spTree>
-    <p:extLst>
-      <p:ext uri="{BB962C8B-B14F-4D97-AF65-F5344CB8AC3E}">
-        <p14:creationId xmlns:p14="http://schemas.microsoft.com/office/powerpoint/2010/main" val="1495743765"/>
-      </p:ext>
-    </p:extLst>
-  </p:cSld>
-  <p:clrMapOvr>
-    <a:masterClrMapping/>
-  </p:clrMapOvr>
-</p:sld>
-</file>
-
-<file path=ppt/slides/slide7.xml><?xml version="1.0" encoding="utf-8"?>
-<p:sld xmlns:a="http://schemas.openxmlformats.org/drawingml/2006/main" xmlns:r="http://schemas.openxmlformats.org/officeDocument/2006/relationships" xmlns:p="http://schemas.openxmlformats.org/presentationml/2006/main">
-  <p:cSld>
-    <p:spTree>
-      <p:nvGrpSpPr>
-        <p:cNvPr id="1" name=""/>
-        <p:cNvGrpSpPr/>
-        <p:nvPr/>
-      </p:nvGrpSpPr>
-      <p:grpSpPr>
-        <a:xfrm>
-          <a:off x="0" y="0"/>
-          <a:ext cx="0" cy="0"/>
-          <a:chOff x="0" y="0"/>
-          <a:chExt cx="0" cy="0"/>
-        </a:xfrm>
-      </p:grpSpPr>
-      <p:sp>
-        <p:nvSpPr>
-          <p:cNvPr id="2" name="Title 1"/>
-          <p:cNvSpPr>
-            <a:spLocks noGrp="1"/>
-          </p:cNvSpPr>
-          <p:nvPr>
-            <p:ph type="title"/>
-          </p:nvPr>
-        </p:nvSpPr>
-        <p:spPr/>
-        <p:txBody>
-          <a:bodyPr/>
-          <a:lstStyle/>
-          <a:p>
-            <a:r>
-              <a:rPr lang="en-NZ" dirty="0" smtClean="0"/>
-              <a:t>Market Research</a:t>
-            </a:r>
-            <a:endParaRPr lang="en-NZ" dirty="0"/>
-          </a:p>
-        </p:txBody>
-      </p:sp>
-      <p:sp>
-        <p:nvSpPr>
-          <p:cNvPr id="3" name="Content Placeholder 2"/>
-          <p:cNvSpPr>
-            <a:spLocks noGrp="1"/>
-          </p:cNvSpPr>
-          <p:nvPr>
-            <p:ph idx="1"/>
-          </p:nvPr>
-        </p:nvSpPr>
-        <p:spPr/>
-        <p:txBody>
-          <a:bodyPr/>
-          <a:lstStyle/>
-          <a:p>
-            <a:endParaRPr lang="en-NZ" dirty="0"/>
-          </a:p>
-        </p:txBody>
-      </p:sp>
-    </p:spTree>
-    <p:extLst>
-      <p:ext uri="{BB962C8B-B14F-4D97-AF65-F5344CB8AC3E}">
-        <p14:creationId xmlns:p14="http://schemas.microsoft.com/office/powerpoint/2010/main" val="1580280769"/>
-      </p:ext>
-    </p:extLst>
-  </p:cSld>
-  <p:clrMapOvr>
-    <a:masterClrMapping/>
-  </p:clrMapOvr>
-</p:sld>
-</file>
-
 <file path=ppt/slides/slide8.xml><?xml version="1.0" encoding="utf-8"?>
 <p:sld xmlns:a="http://schemas.openxmlformats.org/drawingml/2006/main" xmlns:r="http://schemas.openxmlformats.org/officeDocument/2006/relationships" xmlns:p="http://schemas.openxmlformats.org/presentationml/2006/main">
   <p:cSld>
@@ -4509,7 +4698,7 @@
           <a:p>
             <a:r>
               <a:rPr lang="en-NZ" dirty="0" smtClean="0"/>
-              <a:t>Unique Solution</a:t>
+              <a:t>Technology II</a:t>
             </a:r>
             <a:endParaRPr lang="en-NZ" dirty="0"/>
           </a:p>
@@ -4537,7 +4726,7 @@
     </p:spTree>
     <p:extLst>
       <p:ext uri="{BB962C8B-B14F-4D97-AF65-F5344CB8AC3E}">
-        <p14:creationId xmlns:p14="http://schemas.microsoft.com/office/powerpoint/2010/main" val="1831439618"/>
+        <p14:creationId xmlns:p14="http://schemas.microsoft.com/office/powerpoint/2010/main" val="1495743765"/>
       </p:ext>
     </p:extLst>
   </p:cSld>

</xml_diff>

<commit_message>
updated script and powerpoint
</commit_message>
<xml_diff>
--- a/Planning/Timekeeper.pptx
+++ b/Planning/Timekeeper.pptx
@@ -3522,13 +3522,6 @@
   <p:clrMapOvr>
     <a:masterClrMapping/>
   </p:clrMapOvr>
-  <p:timing>
-    <p:tnLst>
-      <p:par>
-        <p:cTn id="1" dur="indefinite" restart="never" nodeType="tmRoot"/>
-      </p:par>
-    </p:tnLst>
-  </p:timing>
 </p:sld>
 </file>
 
@@ -3594,34 +3587,14 @@
           <a:lstStyle/>
           <a:p>
             <a:r>
-              <a:rPr lang="en-NZ" sz="2400" dirty="0" smtClean="0"/>
-              <a:t>New </a:t>
-            </a:r>
-            <a:r>
               <a:rPr lang="en-NZ" sz="2400" dirty="0"/>
-              <a:t>Zealanders work about 15% longer than the OECD average </a:t>
-            </a:r>
-            <a:r>
-              <a:rPr lang="en-NZ" sz="2400" dirty="0" smtClean="0"/>
-              <a:t>and </a:t>
-            </a:r>
+              <a:t>New Zealanders work about 15% longer than the OECD average and produce about 20% less output per person.</a:t>
+            </a:r>
+          </a:p>
+          <a:p>
             <a:r>
               <a:rPr lang="en-NZ" sz="2400" dirty="0"/>
-              <a:t>produce about 20% less output per person</a:t>
-            </a:r>
-            <a:r>
-              <a:rPr lang="en-NZ" sz="2400" dirty="0" smtClean="0"/>
-              <a:t>.</a:t>
-            </a:r>
-          </a:p>
-          <a:p>
-            <a:r>
-              <a:rPr lang="en-NZ" sz="2400" dirty="0" smtClean="0"/>
-              <a:t>Timekee</a:t>
-            </a:r>
-            <a:r>
-              <a:rPr lang="en-NZ" sz="2400" dirty="0" smtClean="0"/>
-              <a:t>per aims to address this problem of reduced productivity in the workplace</a:t>
+              <a:t>Timekeeper aims to address this problem of reduced productivity in the workplace</a:t>
             </a:r>
           </a:p>
           <a:p>
@@ -3632,18 +3605,18 @@
           </a:p>
           <a:p>
             <a:r>
-              <a:rPr lang="en-NZ" sz="2400" dirty="0" smtClean="0"/>
+              <a:rPr lang="en-NZ" sz="2400" dirty="0"/>
               <a:t>With increased productivity comes increased profits and companies do better financially</a:t>
             </a:r>
           </a:p>
           <a:p>
             <a:r>
-              <a:rPr lang="en-NZ" sz="2400" dirty="0" smtClean="0"/>
+              <a:rPr lang="en-NZ" sz="2400" dirty="0"/>
               <a:t>Allows companies to better support New Zealanders</a:t>
             </a:r>
           </a:p>
           <a:p>
-            <a:endParaRPr lang="en-NZ" sz="2400" dirty="0" smtClean="0"/>
+            <a:endParaRPr lang="en-NZ" sz="2400" dirty="0"/>
           </a:p>
         </p:txBody>
       </p:sp>
@@ -3657,13 +3630,6 @@
   <p:clrMapOvr>
     <a:masterClrMapping/>
   </p:clrMapOvr>
-  <p:timing>
-    <p:tnLst>
-      <p:par>
-        <p:cTn id="1" dur="indefinite" restart="never" nodeType="tmRoot"/>
-      </p:par>
-    </p:tnLst>
-  </p:timing>
 </p:sld>
 </file>
 
@@ -3700,10 +3666,9 @@
           <a:lstStyle/>
           <a:p>
             <a:r>
-              <a:rPr lang="en-NZ" dirty="0" smtClean="0"/>
+              <a:rPr lang="en-NZ" dirty="0"/>
               <a:t>Distractions</a:t>
             </a:r>
-            <a:endParaRPr lang="en-NZ" dirty="0"/>
           </a:p>
         </p:txBody>
       </p:sp>
@@ -4088,63 +4053,57 @@
           <a:lstStyle/>
           <a:p>
             <a:r>
-              <a:rPr lang="en-NZ" dirty="0" smtClean="0"/>
+              <a:rPr lang="en-NZ" dirty="0"/>
               <a:t>System tracking software installed on employee workstation</a:t>
             </a:r>
           </a:p>
           <a:p>
             <a:r>
-              <a:rPr lang="en-NZ" dirty="0" smtClean="0"/>
+              <a:rPr lang="en-NZ" dirty="0"/>
               <a:t>Determine the current active window over time</a:t>
             </a:r>
           </a:p>
           <a:p>
             <a:r>
-              <a:rPr lang="en-NZ" dirty="0" smtClean="0"/>
+              <a:rPr lang="en-NZ" dirty="0"/>
               <a:t>Track trends in worker productivity</a:t>
             </a:r>
           </a:p>
           <a:p>
-            <a:endParaRPr lang="en-NZ" dirty="0" smtClean="0"/>
-          </a:p>
-          <a:p>
-            <a:r>
-              <a:rPr lang="en-NZ" dirty="0" smtClean="0"/>
+            <a:endParaRPr lang="en-NZ" dirty="0"/>
+          </a:p>
+          <a:p>
+            <a:r>
+              <a:rPr lang="en-NZ" dirty="0"/>
               <a:t>Supervisor views mobile / windows cross platform application </a:t>
             </a:r>
+          </a:p>
+          <a:p>
+            <a:r>
+              <a:rPr lang="en-NZ" dirty="0"/>
+              <a:t>Can set classifications for applications and websites</a:t>
+            </a:r>
+          </a:p>
+          <a:p>
+            <a:r>
+              <a:rPr lang="en-NZ" dirty="0"/>
+              <a:t>Choose to set names or not</a:t>
+            </a:r>
+          </a:p>
+          <a:p>
+            <a:r>
+              <a:rPr lang="en-NZ" dirty="0"/>
+              <a:t>Allows supervisors to tailor plans to workplace productivity trends</a:t>
+            </a:r>
+          </a:p>
+          <a:p>
             <a:endParaRPr lang="en-NZ" dirty="0"/>
           </a:p>
           <a:p>
-            <a:r>
-              <a:rPr lang="en-NZ" dirty="0"/>
-              <a:t>C</a:t>
-            </a:r>
-            <a:r>
-              <a:rPr lang="en-NZ" dirty="0" smtClean="0"/>
-              <a:t>an set classifications for applications and websites</a:t>
-            </a:r>
-          </a:p>
-          <a:p>
-            <a:r>
-              <a:rPr lang="en-NZ" dirty="0" smtClean="0"/>
-              <a:t>Choose to set names or not</a:t>
-            </a:r>
             <a:endParaRPr lang="en-NZ" dirty="0"/>
           </a:p>
           <a:p>
-            <a:r>
-              <a:rPr lang="en-NZ" dirty="0" smtClean="0"/>
-              <a:t>Allows supervisors to tailor plans to workplace productivity trends</a:t>
-            </a:r>
-          </a:p>
-          <a:p>
-            <a:endParaRPr lang="en-NZ" dirty="0" smtClean="0"/>
-          </a:p>
-          <a:p>
-            <a:endParaRPr lang="en-NZ" dirty="0" smtClean="0"/>
-          </a:p>
-          <a:p>
-            <a:endParaRPr lang="en-NZ" dirty="0" smtClean="0"/>
+            <a:endParaRPr lang="en-NZ" dirty="0"/>
           </a:p>
         </p:txBody>
       </p:sp>
@@ -4199,13 +4158,6 @@
   <p:clrMapOvr>
     <a:masterClrMapping/>
   </p:clrMapOvr>
-  <p:timing>
-    <p:tnLst>
-      <p:par>
-        <p:cTn id="1" dur="indefinite" restart="never" nodeType="tmRoot"/>
-      </p:par>
-    </p:tnLst>
-  </p:timing>
 </p:sld>
 </file>
 
@@ -4242,10 +4194,9 @@
           <a:lstStyle/>
           <a:p>
             <a:r>
-              <a:rPr lang="en-NZ" dirty="0" smtClean="0"/>
+              <a:rPr lang="en-NZ" dirty="0"/>
               <a:t>Market Research</a:t>
             </a:r>
-            <a:endParaRPr lang="en-NZ" dirty="0"/>
           </a:p>
         </p:txBody>
       </p:sp>
@@ -4270,29 +4221,29 @@
           <a:lstStyle/>
           <a:p>
             <a:r>
-              <a:rPr lang="en-NZ" dirty="0" smtClean="0"/>
+              <a:rPr lang="en-NZ" dirty="0"/>
               <a:t>Main competitor: Existing product called </a:t>
             </a:r>
             <a:r>
-              <a:rPr lang="en-NZ" dirty="0" err="1" smtClean="0"/>
+              <a:rPr lang="en-NZ" dirty="0" err="1"/>
               <a:t>WorkTime</a:t>
             </a:r>
-            <a:endParaRPr lang="en-NZ" dirty="0" smtClean="0"/>
-          </a:p>
-          <a:p>
-            <a:endParaRPr lang="en-NZ" dirty="0" smtClean="0"/>
-          </a:p>
-          <a:p>
             <a:endParaRPr lang="en-NZ" dirty="0"/>
           </a:p>
           <a:p>
-            <a:endParaRPr lang="en-NZ" dirty="0" smtClean="0"/>
-          </a:p>
-          <a:p>
             <a:endParaRPr lang="en-NZ" dirty="0"/>
           </a:p>
           <a:p>
-            <a:endParaRPr lang="en-NZ" dirty="0" smtClean="0"/>
+            <a:endParaRPr lang="en-NZ" dirty="0"/>
+          </a:p>
+          <a:p>
+            <a:endParaRPr lang="en-NZ" dirty="0"/>
+          </a:p>
+          <a:p>
+            <a:endParaRPr lang="en-NZ" dirty="0"/>
+          </a:p>
+          <a:p>
+            <a:endParaRPr lang="en-NZ" dirty="0"/>
           </a:p>
           <a:p>
             <a:pPr marL="0" indent="0">
@@ -4302,32 +4253,33 @@
           </a:p>
           <a:p>
             <a:r>
-              <a:rPr lang="en-NZ" dirty="0" smtClean="0"/>
+              <a:rPr lang="en-NZ" dirty="0"/>
               <a:t>Timekeeper will have a more modern and easier to view UI</a:t>
             </a:r>
           </a:p>
           <a:p>
             <a:r>
-              <a:rPr lang="en-NZ" dirty="0" smtClean="0"/>
-              <a:t>Less invasive</a:t>
-            </a:r>
-          </a:p>
-          <a:p>
-            <a:r>
-              <a:rPr lang="en-NZ" dirty="0" smtClean="0"/>
+              <a:rPr lang="en-NZ" dirty="0"/>
+              <a:t>More customisable for individual businesses</a:t>
+            </a:r>
+            <a:endParaRPr lang="en-NZ" dirty="0"/>
+          </a:p>
+          <a:p>
+            <a:r>
+              <a:rPr lang="en-NZ" dirty="0"/>
+              <a:t>Less invasive, no sensitive or personal information collected</a:t>
+            </a:r>
+          </a:p>
+          <a:p>
+            <a:r>
+              <a:rPr lang="en-NZ" dirty="0"/>
               <a:t>More company wide productivity trends and graphs</a:t>
             </a:r>
           </a:p>
           <a:p>
             <a:r>
-              <a:rPr lang="en-NZ" dirty="0" smtClean="0"/>
-              <a:t>More outcome focussed</a:t>
-            </a:r>
-          </a:p>
-          <a:p>
-            <a:r>
-              <a:rPr lang="en-NZ" dirty="0" smtClean="0"/>
-              <a:t>Aimed at helping supervisors to plan for improvement, rather than simply showing real time and past statistics</a:t>
+              <a:rPr lang="en-NZ" dirty="0"/>
+              <a:t>Helps supervisors to plan for improvement, not just shows real time and past statistics</a:t>
             </a:r>
           </a:p>
           <a:p>
@@ -4405,27 +4357,92 @@
           <a:lstStyle/>
           <a:p>
             <a:r>
-              <a:rPr lang="en-NZ" dirty="0" smtClean="0"/>
+              <a:rPr lang="en-NZ" dirty="0"/>
               <a:t>Business Model</a:t>
             </a:r>
+          </a:p>
+        </p:txBody>
+      </p:sp>
+      <p:sp>
+        <p:nvSpPr>
+          <p:cNvPr id="3" name="Content Placeholder 2"/>
+          <p:cNvSpPr>
+            <a:spLocks noGrp="1"/>
+          </p:cNvSpPr>
+          <p:nvPr>
+            <p:ph idx="1"/>
+          </p:nvPr>
+        </p:nvSpPr>
+        <p:spPr/>
+        <p:txBody>
+          <a:bodyPr/>
+          <a:lstStyle/>
+          <a:p>
+            <a:pPr marL="0" indent="0">
+              <a:buNone/>
+            </a:pPr>
             <a:endParaRPr lang="en-NZ" dirty="0"/>
           </a:p>
-        </p:txBody>
-      </p:sp>
-      <p:sp>
-        <p:nvSpPr>
-          <p:cNvPr id="3" name="Content Placeholder 2"/>
-          <p:cNvSpPr>
-            <a:spLocks noGrp="1"/>
-          </p:cNvSpPr>
-          <p:nvPr>
-            <p:ph idx="1"/>
-          </p:nvPr>
-        </p:nvSpPr>
-        <p:spPr/>
-        <p:txBody>
-          <a:bodyPr/>
-          <a:lstStyle/>
+          <a:p>
+            <a:r>
+              <a:rPr lang="en-NZ" dirty="0"/>
+              <a:t>Small to medium sized NZ companies that use computers</a:t>
+            </a:r>
+          </a:p>
+          <a:p>
+            <a:r>
+              <a:rPr lang="en-NZ" dirty="0"/>
+              <a:t>Particularly those lagging in the transition to digital technology</a:t>
+            </a:r>
+          </a:p>
+          <a:p>
+            <a:pPr marL="0" indent="0">
+              <a:buNone/>
+            </a:pPr>
+            <a:endParaRPr lang="en-NZ" dirty="0"/>
+          </a:p>
+          <a:p>
+            <a:r>
+              <a:rPr lang="en-NZ" dirty="0"/>
+              <a:t>Recurring subscription based software as a service</a:t>
+            </a:r>
+          </a:p>
+          <a:p>
+            <a:r>
+              <a:rPr lang="en-NZ" dirty="0"/>
+              <a:t>Optional installation fee</a:t>
+            </a:r>
+          </a:p>
+          <a:p>
+            <a:r>
+              <a:rPr lang="en-NZ" dirty="0"/>
+              <a:t>Relatively cheap to provide, only server maintenance and employee wages</a:t>
+            </a:r>
+          </a:p>
+          <a:p>
+            <a:pPr marL="0" indent="0">
+              <a:buNone/>
+            </a:pPr>
+            <a:endParaRPr lang="en-NZ" dirty="0"/>
+          </a:p>
+          <a:p>
+            <a:r>
+              <a:rPr lang="en-NZ" dirty="0"/>
+              <a:t>Partner with companies that already provide software or web service to companies (i.e. Microsoft)</a:t>
+            </a:r>
+          </a:p>
+          <a:p>
+            <a:r>
+              <a:rPr lang="en-NZ" dirty="0"/>
+              <a:t>Some sort of package deal</a:t>
+            </a:r>
+          </a:p>
+          <a:p>
+            <a:endParaRPr lang="en-NZ" dirty="0"/>
+          </a:p>
+          <a:p>
+            <a:endParaRPr lang="en-NZ" dirty="0"/>
+          </a:p>
           <a:p>
             <a:endParaRPr lang="en-NZ" dirty="0"/>
           </a:p>
@@ -4477,10 +4494,26 @@
           <a:lstStyle/>
           <a:p>
             <a:r>
-              <a:rPr lang="en-NZ" dirty="0" smtClean="0"/>
-              <a:t>Technology	</a:t>
-            </a:r>
-            <a:endParaRPr lang="en-NZ" dirty="0"/>
+              <a:rPr lang="en-NZ" dirty="0"/>
+              <a:t>Technology</a:t>
+            </a:r>
+            <a:br>
+              <a:rPr lang="en-NZ" dirty="0"/>
+            </a:br>
+            <a:br>
+              <a:rPr lang="en-NZ" dirty="0"/>
+            </a:br>
+            <a:r>
+              <a:rPr lang="en-NZ" dirty="0"/>
+              <a:t>Employee </a:t>
+            </a:r>
+            <a:br>
+              <a:rPr lang="en-NZ" dirty="0"/>
+            </a:br>
+            <a:r>
+              <a:rPr lang="en-NZ" dirty="0"/>
+              <a:t>Side	</a:t>
+            </a:r>
           </a:p>
         </p:txBody>
       </p:sp>
@@ -4506,20 +4539,20 @@
           </a:bodyPr>
           <a:lstStyle/>
           <a:p>
-            <a:endParaRPr lang="en-NZ" dirty="0" smtClean="0"/>
-          </a:p>
-          <a:p>
             <a:endParaRPr lang="en-NZ" dirty="0"/>
           </a:p>
           <a:p>
+            <a:endParaRPr lang="en-NZ" dirty="0"/>
+          </a:p>
+          <a:p>
             <a:pPr lvl="1"/>
-            <a:endParaRPr lang="en-NZ" dirty="0" smtClean="0"/>
-          </a:p>
-          <a:p>
-            <a:endParaRPr lang="en-NZ" dirty="0" smtClean="0"/>
-          </a:p>
-          <a:p>
-            <a:endParaRPr lang="en-NZ" dirty="0" smtClean="0"/>
+            <a:endParaRPr lang="en-NZ" dirty="0"/>
+          </a:p>
+          <a:p>
+            <a:endParaRPr lang="en-NZ" dirty="0"/>
+          </a:p>
+          <a:p>
+            <a:endParaRPr lang="en-NZ" dirty="0"/>
           </a:p>
         </p:txBody>
       </p:sp>
@@ -4546,7 +4579,7 @@
         </p:blipFill>
         <p:spPr bwMode="auto">
           <a:xfrm>
-            <a:off x="4795941" y="476315"/>
+            <a:off x="9711469" y="515197"/>
             <a:ext cx="1472999" cy="1653967"/>
           </a:xfrm>
           <a:prstGeom prst="rect">
@@ -4587,7 +4620,7 @@
         </p:blipFill>
         <p:spPr bwMode="auto">
           <a:xfrm>
-            <a:off x="7014719" y="476315"/>
+            <a:off x="9711469" y="4444735"/>
             <a:ext cx="1598835" cy="1653967"/>
           </a:xfrm>
           <a:prstGeom prst="rect">
@@ -4605,45 +4638,310 @@
           </a:extLst>
         </p:spPr>
       </p:pic>
-      <p:pic>
-        <p:nvPicPr>
-          <p:cNvPr id="1026" name="Picture 2" descr="https://www.xamarin.com/content/images/pages/branding/assets/xamagon.png"/>
-          <p:cNvPicPr>
-            <a:picLocks noChangeAspect="1" noChangeArrowheads="1"/>
-          </p:cNvPicPr>
+      <p:sp>
+        <p:nvSpPr>
+          <p:cNvPr id="10" name="Content Placeholder 2"/>
+          <p:cNvSpPr txBox="1">
+            <a:spLocks/>
+          </p:cNvSpPr>
           <p:nvPr/>
-        </p:nvPicPr>
-        <p:blipFill rotWithShape="1">
-          <a:blip r:embed="rId4">
-            <a:extLst>
-              <a:ext uri="{28A0092B-C50C-407E-A947-70E740481C1C}">
-                <a14:useLocalDpi xmlns:a14="http://schemas.microsoft.com/office/drawing/2010/main" val="0"/>
-              </a:ext>
-            </a:extLst>
-          </a:blip>
-          <a:srcRect l="17796" t="20987" r="17235" b="20820"/>
-          <a:stretch/>
-        </p:blipFill>
-        <p:spPr bwMode="auto">
+        </p:nvSpPr>
+        <p:spPr>
           <a:xfrm>
-            <a:off x="9212367" y="476315"/>
-            <a:ext cx="1846582" cy="1653967"/>
+            <a:off x="3869268" y="864108"/>
+            <a:ext cx="7315200" cy="5120640"/>
           </a:xfrm>
           <a:prstGeom prst="rect">
             <a:avLst/>
           </a:prstGeom>
-          <a:noFill/>
-          <a:extLst>
-            <a:ext uri="{909E8E84-426E-40DD-AFC4-6F175D3DCCD1}">
-              <a14:hiddenFill xmlns:a14="http://schemas.microsoft.com/office/drawing/2010/main">
+        </p:spPr>
+        <p:txBody>
+          <a:bodyPr vert="horz" lIns="91440" tIns="45720" rIns="91440" bIns="45720" rtlCol="0" anchor="ctr">
+            <a:normAutofit/>
+          </a:bodyPr>
+          <a:lstStyle>
+            <a:lvl1pPr marL="182880" indent="-182880" algn="l" defTabSz="914400" rtl="0" eaLnBrk="1" latinLnBrk="0" hangingPunct="1">
+              <a:lnSpc>
+                <a:spcPct val="90000"/>
+              </a:lnSpc>
+              <a:spcBef>
+                <a:spcPts val="1200"/>
+              </a:spcBef>
+              <a:buClr>
+                <a:schemeClr val="accent1"/>
+              </a:buClr>
+              <a:buFont typeface="Wingdings 2" pitchFamily="18" charset="2"/>
+              <a:buChar char=""/>
+              <a:defRPr sz="2000" kern="1200">
                 <a:solidFill>
-                  <a:srgbClr val="FFFFFF"/>
+                  <a:schemeClr val="tx1">
+                    <a:lumMod val="65000"/>
+                    <a:lumOff val="35000"/>
+                  </a:schemeClr>
                 </a:solidFill>
-              </a14:hiddenFill>
-            </a:ext>
-          </a:extLst>
-        </p:spPr>
-      </p:pic>
+                <a:latin typeface="+mn-lt"/>
+                <a:ea typeface="+mn-ea"/>
+                <a:cs typeface="+mn-cs"/>
+              </a:defRPr>
+            </a:lvl1pPr>
+            <a:lvl2pPr marL="685800" indent="-182880" algn="l" defTabSz="914400" rtl="0" eaLnBrk="1" latinLnBrk="0" hangingPunct="1">
+              <a:lnSpc>
+                <a:spcPct val="90000"/>
+              </a:lnSpc>
+              <a:spcBef>
+                <a:spcPts val="250"/>
+              </a:spcBef>
+              <a:spcAft>
+                <a:spcPts val="250"/>
+              </a:spcAft>
+              <a:buClr>
+                <a:schemeClr val="accent1"/>
+              </a:buClr>
+              <a:buFont typeface="Wingdings 2" pitchFamily="18" charset="2"/>
+              <a:buChar char=""/>
+              <a:defRPr sz="1800" kern="1200">
+                <a:solidFill>
+                  <a:schemeClr val="tx1">
+                    <a:lumMod val="65000"/>
+                    <a:lumOff val="35000"/>
+                  </a:schemeClr>
+                </a:solidFill>
+                <a:latin typeface="+mn-lt"/>
+                <a:ea typeface="+mn-ea"/>
+                <a:cs typeface="+mn-cs"/>
+              </a:defRPr>
+            </a:lvl2pPr>
+            <a:lvl3pPr marL="1143000" indent="-182880" algn="l" defTabSz="914400" rtl="0" eaLnBrk="1" latinLnBrk="0" hangingPunct="1">
+              <a:lnSpc>
+                <a:spcPct val="90000"/>
+              </a:lnSpc>
+              <a:spcBef>
+                <a:spcPts val="250"/>
+              </a:spcBef>
+              <a:spcAft>
+                <a:spcPts val="250"/>
+              </a:spcAft>
+              <a:buClr>
+                <a:schemeClr val="accent1"/>
+              </a:buClr>
+              <a:buFont typeface="Wingdings 2" pitchFamily="18" charset="2"/>
+              <a:buChar char=""/>
+              <a:defRPr sz="1600" kern="1200">
+                <a:solidFill>
+                  <a:schemeClr val="tx1">
+                    <a:lumMod val="65000"/>
+                    <a:lumOff val="35000"/>
+                  </a:schemeClr>
+                </a:solidFill>
+                <a:latin typeface="+mn-lt"/>
+                <a:ea typeface="+mn-ea"/>
+                <a:cs typeface="+mn-cs"/>
+              </a:defRPr>
+            </a:lvl3pPr>
+            <a:lvl4pPr marL="1600200" indent="-182880" algn="l" defTabSz="914400" rtl="0" eaLnBrk="1" latinLnBrk="0" hangingPunct="1">
+              <a:lnSpc>
+                <a:spcPct val="90000"/>
+              </a:lnSpc>
+              <a:spcBef>
+                <a:spcPts val="250"/>
+              </a:spcBef>
+              <a:spcAft>
+                <a:spcPts val="250"/>
+              </a:spcAft>
+              <a:buClr>
+                <a:schemeClr val="accent1"/>
+              </a:buClr>
+              <a:buFont typeface="Wingdings 2" pitchFamily="18" charset="2"/>
+              <a:buChar char=""/>
+              <a:defRPr sz="1400" kern="1200">
+                <a:solidFill>
+                  <a:schemeClr val="tx1">
+                    <a:lumMod val="65000"/>
+                    <a:lumOff val="35000"/>
+                  </a:schemeClr>
+                </a:solidFill>
+                <a:latin typeface="+mn-lt"/>
+                <a:ea typeface="+mn-ea"/>
+                <a:cs typeface="+mn-cs"/>
+              </a:defRPr>
+            </a:lvl4pPr>
+            <a:lvl5pPr marL="2057400" indent="-182880" algn="l" defTabSz="914400" rtl="0" eaLnBrk="1" latinLnBrk="0" hangingPunct="1">
+              <a:lnSpc>
+                <a:spcPct val="90000"/>
+              </a:lnSpc>
+              <a:spcBef>
+                <a:spcPts val="250"/>
+              </a:spcBef>
+              <a:spcAft>
+                <a:spcPts val="250"/>
+              </a:spcAft>
+              <a:buClr>
+                <a:schemeClr val="accent1"/>
+              </a:buClr>
+              <a:buFont typeface="Wingdings 2" pitchFamily="18" charset="2"/>
+              <a:buChar char=""/>
+              <a:defRPr sz="1400" kern="1200">
+                <a:solidFill>
+                  <a:schemeClr val="tx1">
+                    <a:lumMod val="65000"/>
+                    <a:lumOff val="35000"/>
+                  </a:schemeClr>
+                </a:solidFill>
+                <a:latin typeface="+mn-lt"/>
+                <a:ea typeface="+mn-ea"/>
+                <a:cs typeface="+mn-cs"/>
+              </a:defRPr>
+            </a:lvl5pPr>
+            <a:lvl6pPr marL="2514600" indent="-228600" algn="l" defTabSz="914400" rtl="0" eaLnBrk="1" latinLnBrk="0" hangingPunct="1">
+              <a:lnSpc>
+                <a:spcPct val="90000"/>
+              </a:lnSpc>
+              <a:spcBef>
+                <a:spcPts val="250"/>
+              </a:spcBef>
+              <a:spcAft>
+                <a:spcPts val="250"/>
+              </a:spcAft>
+              <a:buClr>
+                <a:schemeClr val="accent1"/>
+              </a:buClr>
+              <a:buFont typeface="Wingdings 2" pitchFamily="18" charset="2"/>
+              <a:buChar char=""/>
+              <a:defRPr sz="1400" kern="1200">
+                <a:solidFill>
+                  <a:schemeClr val="tx1">
+                    <a:lumMod val="65000"/>
+                    <a:lumOff val="35000"/>
+                  </a:schemeClr>
+                </a:solidFill>
+                <a:latin typeface="+mn-lt"/>
+                <a:ea typeface="+mn-ea"/>
+                <a:cs typeface="+mn-cs"/>
+              </a:defRPr>
+            </a:lvl6pPr>
+            <a:lvl7pPr marL="2971800" indent="-228600" algn="l" defTabSz="914400" rtl="0" eaLnBrk="1" latinLnBrk="0" hangingPunct="1">
+              <a:lnSpc>
+                <a:spcPct val="90000"/>
+              </a:lnSpc>
+              <a:spcBef>
+                <a:spcPts val="250"/>
+              </a:spcBef>
+              <a:spcAft>
+                <a:spcPts val="250"/>
+              </a:spcAft>
+              <a:buClr>
+                <a:schemeClr val="accent1"/>
+              </a:buClr>
+              <a:buFont typeface="Wingdings 2" pitchFamily="18" charset="2"/>
+              <a:buChar char=""/>
+              <a:defRPr sz="1400" kern="1200">
+                <a:solidFill>
+                  <a:schemeClr val="tx1">
+                    <a:lumMod val="65000"/>
+                    <a:lumOff val="35000"/>
+                  </a:schemeClr>
+                </a:solidFill>
+                <a:latin typeface="+mn-lt"/>
+                <a:ea typeface="+mn-ea"/>
+                <a:cs typeface="+mn-cs"/>
+              </a:defRPr>
+            </a:lvl7pPr>
+            <a:lvl8pPr marL="3429000" indent="-228600" algn="l" defTabSz="914400" rtl="0" eaLnBrk="1" latinLnBrk="0" hangingPunct="1">
+              <a:lnSpc>
+                <a:spcPct val="90000"/>
+              </a:lnSpc>
+              <a:spcBef>
+                <a:spcPts val="250"/>
+              </a:spcBef>
+              <a:spcAft>
+                <a:spcPts val="250"/>
+              </a:spcAft>
+              <a:buClr>
+                <a:schemeClr val="accent1"/>
+              </a:buClr>
+              <a:buFont typeface="Wingdings 2" pitchFamily="18" charset="2"/>
+              <a:buChar char=""/>
+              <a:defRPr sz="1400" kern="1200">
+                <a:solidFill>
+                  <a:schemeClr val="tx1">
+                    <a:lumMod val="65000"/>
+                    <a:lumOff val="35000"/>
+                  </a:schemeClr>
+                </a:solidFill>
+                <a:latin typeface="+mn-lt"/>
+                <a:ea typeface="+mn-ea"/>
+                <a:cs typeface="+mn-cs"/>
+              </a:defRPr>
+            </a:lvl8pPr>
+            <a:lvl9pPr marL="3886200" indent="-228600" algn="l" defTabSz="914400" rtl="0" eaLnBrk="1" latinLnBrk="0" hangingPunct="1">
+              <a:lnSpc>
+                <a:spcPct val="90000"/>
+              </a:lnSpc>
+              <a:spcBef>
+                <a:spcPts val="250"/>
+              </a:spcBef>
+              <a:spcAft>
+                <a:spcPts val="250"/>
+              </a:spcAft>
+              <a:buClr>
+                <a:schemeClr val="accent1"/>
+              </a:buClr>
+              <a:buFont typeface="Wingdings 2" pitchFamily="18" charset="2"/>
+              <a:buChar char=""/>
+              <a:defRPr sz="1400" kern="1200">
+                <a:solidFill>
+                  <a:schemeClr val="tx1">
+                    <a:lumMod val="65000"/>
+                    <a:lumOff val="35000"/>
+                  </a:schemeClr>
+                </a:solidFill>
+                <a:latin typeface="+mn-lt"/>
+                <a:ea typeface="+mn-ea"/>
+                <a:cs typeface="+mn-cs"/>
+              </a:defRPr>
+            </a:lvl9pPr>
+          </a:lstStyle>
+          <a:p>
+            <a:r>
+              <a:rPr lang="en-NZ" dirty="0"/>
+              <a:t>Installed as a windows forms application</a:t>
+            </a:r>
+          </a:p>
+          <a:p>
+            <a:r>
+              <a:rPr lang="en-NZ" dirty="0"/>
+              <a:t>Exists solely in the system tray</a:t>
+            </a:r>
+          </a:p>
+          <a:p>
+            <a:r>
+              <a:rPr lang="en-NZ" dirty="0"/>
+              <a:t>No application window</a:t>
+            </a:r>
+          </a:p>
+          <a:p>
+            <a:endParaRPr lang="en-NZ" dirty="0"/>
+          </a:p>
+          <a:p>
+            <a:r>
+              <a:rPr lang="en-NZ" dirty="0"/>
+              <a:t>Uploads to database the current active window title</a:t>
+            </a:r>
+          </a:p>
+          <a:p>
+            <a:r>
+              <a:rPr lang="en-NZ" dirty="0"/>
+              <a:t>Workstation ID</a:t>
+            </a:r>
+          </a:p>
+          <a:p>
+            <a:r>
+              <a:rPr lang="en-NZ" dirty="0"/>
+              <a:t>Date and time</a:t>
+            </a:r>
+          </a:p>
+        </p:txBody>
+      </p:sp>
     </p:spTree>
     <p:extLst>
       <p:ext uri="{BB962C8B-B14F-4D97-AF65-F5344CB8AC3E}">
@@ -4654,13 +4952,6 @@
   <p:clrMapOvr>
     <a:masterClrMapping/>
   </p:clrMapOvr>
-  <p:timing>
-    <p:tnLst>
-      <p:par>
-        <p:cTn id="1" dur="indefinite" restart="never" nodeType="tmRoot"/>
-      </p:par>
-    </p:tnLst>
-  </p:timing>
 </p:sld>
 </file>
 
@@ -4697,32 +4988,138 @@
           <a:lstStyle/>
           <a:p>
             <a:r>
-              <a:rPr lang="en-NZ" dirty="0" smtClean="0"/>
+              <a:rPr lang="en-NZ" dirty="0"/>
               <a:t>Technology II</a:t>
             </a:r>
+            <a:br>
+              <a:rPr lang="en-NZ" dirty="0"/>
+            </a:br>
+            <a:br>
+              <a:rPr lang="en-NZ" dirty="0"/>
+            </a:br>
+            <a:r>
+              <a:rPr lang="en-NZ" dirty="0"/>
+              <a:t>Supervisor </a:t>
+            </a:r>
+            <a:br>
+              <a:rPr lang="en-NZ" dirty="0"/>
+            </a:br>
+            <a:r>
+              <a:rPr lang="en-NZ" dirty="0"/>
+              <a:t>Side</a:t>
+            </a:r>
+          </a:p>
+        </p:txBody>
+      </p:sp>
+      <p:sp>
+        <p:nvSpPr>
+          <p:cNvPr id="3" name="Content Placeholder 2"/>
+          <p:cNvSpPr>
+            <a:spLocks noGrp="1"/>
+          </p:cNvSpPr>
+          <p:nvPr>
+            <p:ph idx="1"/>
+          </p:nvPr>
+        </p:nvSpPr>
+        <p:spPr/>
+        <p:txBody>
+          <a:bodyPr/>
+          <a:lstStyle/>
+          <a:p>
+            <a:r>
+              <a:rPr lang="en-NZ" dirty="0"/>
+              <a:t>A Xamarin mobile / windows cross platform application</a:t>
+            </a:r>
+          </a:p>
+          <a:p>
+            <a:r>
+              <a:rPr lang="en-NZ" dirty="0"/>
+              <a:t>Supervisor can use both phone and desktop to view </a:t>
+            </a:r>
+          </a:p>
+          <a:p>
             <a:endParaRPr lang="en-NZ" dirty="0"/>
           </a:p>
-        </p:txBody>
-      </p:sp>
-      <p:sp>
-        <p:nvSpPr>
-          <p:cNvPr id="3" name="Content Placeholder 2"/>
-          <p:cNvSpPr>
-            <a:spLocks noGrp="1"/>
-          </p:cNvSpPr>
-          <p:nvPr>
-            <p:ph idx="1"/>
-          </p:nvPr>
-        </p:nvSpPr>
-        <p:spPr/>
-        <p:txBody>
-          <a:bodyPr/>
-          <a:lstStyle/>
-          <a:p>
-            <a:endParaRPr lang="en-NZ"/>
-          </a:p>
-        </p:txBody>
-      </p:sp>
+          <a:p>
+            <a:r>
+              <a:rPr lang="en-NZ" dirty="0"/>
+              <a:t>List of users </a:t>
+            </a:r>
+          </a:p>
+          <a:p>
+            <a:r>
+              <a:rPr lang="en-NZ" dirty="0"/>
+              <a:t>List of applications and websites</a:t>
+            </a:r>
+          </a:p>
+          <a:p>
+            <a:r>
+              <a:rPr lang="en-NZ" dirty="0"/>
+              <a:t>Customisation</a:t>
+            </a:r>
+          </a:p>
+          <a:p>
+            <a:r>
+              <a:rPr lang="en-NZ" dirty="0"/>
+              <a:t>Company-wide trends and graphs</a:t>
+            </a:r>
+          </a:p>
+          <a:p>
+            <a:r>
+              <a:rPr lang="en-NZ" dirty="0"/>
+              <a:t>Suggestions to improve productivity</a:t>
+            </a:r>
+          </a:p>
+          <a:p>
+            <a:endParaRPr lang="en-NZ" dirty="0"/>
+          </a:p>
+          <a:p>
+            <a:r>
+              <a:rPr lang="en-NZ" dirty="0"/>
+              <a:t>Live demo</a:t>
+            </a:r>
+          </a:p>
+        </p:txBody>
+      </p:sp>
+      <p:pic>
+        <p:nvPicPr>
+          <p:cNvPr id="1026" name="Picture 2" descr="Image result for xamarin icon png"/>
+          <p:cNvPicPr>
+            <a:picLocks noChangeAspect="1" noChangeArrowheads="1"/>
+          </p:cNvPicPr>
+          <p:nvPr/>
+        </p:nvPicPr>
+        <p:blipFill rotWithShape="1">
+          <a:blip r:embed="rId2">
+            <a:extLst>
+              <a:ext uri="{28A0092B-C50C-407E-A947-70E740481C1C}">
+                <a14:useLocalDpi xmlns:a14="http://schemas.microsoft.com/office/drawing/2010/main" val="0"/>
+              </a:ext>
+            </a:extLst>
+          </a:blip>
+          <a:srcRect l="5601" t="9251" r="5432" b="8868"/>
+          <a:stretch/>
+        </p:blipFill>
+        <p:spPr bwMode="auto">
+          <a:xfrm>
+            <a:off x="9379699" y="4500227"/>
+            <a:ext cx="1804769" cy="1661020"/>
+          </a:xfrm>
+          <a:prstGeom prst="rect">
+            <a:avLst/>
+          </a:prstGeom>
+          <a:noFill/>
+          <a:extLst>
+            <a:ext uri="{909E8E84-426E-40DD-AFC4-6F175D3DCCD1}">
+              <a14:hiddenFill xmlns:a14="http://schemas.microsoft.com/office/drawing/2010/main">
+                <a:solidFill>
+                  <a:srgbClr val="FFFFFF"/>
+                </a:solidFill>
+              </a14:hiddenFill>
+            </a:ext>
+          </a:extLst>
+        </p:spPr>
+      </p:pic>
     </p:spTree>
     <p:extLst>
       <p:ext uri="{BB962C8B-B14F-4D97-AF65-F5344CB8AC3E}">
@@ -4769,10 +5166,9 @@
           <a:lstStyle/>
           <a:p>
             <a:r>
-              <a:rPr lang="en-NZ" dirty="0" smtClean="0"/>
+              <a:rPr lang="en-NZ" dirty="0"/>
               <a:t>References</a:t>
             </a:r>
-            <a:endParaRPr lang="en-NZ" dirty="0"/>
           </a:p>
         </p:txBody>
       </p:sp>
@@ -4795,15 +5191,18 @@
               <a:rPr lang="en-NZ" dirty="0">
                 <a:hlinkClick r:id="rId2"/>
               </a:rPr>
-              <a:t>http://</a:t>
-            </a:r>
-            <a:r>
-              <a:rPr lang="en-NZ" dirty="0" smtClean="0">
-                <a:hlinkClick r:id="rId2"/>
+              <a:t>http://www.productivity.govt.nz/blog/how-does-nz%E2%80%99s-productivity-performance-stack-up</a:t>
+            </a:r>
+            <a:endParaRPr lang="en-NZ" dirty="0"/>
+          </a:p>
+          <a:p>
+            <a:r>
+              <a:rPr lang="en-NZ" dirty="0">
+                <a:hlinkClick r:id="rId3"/>
               </a:rPr>
-              <a:t>www.productivity.govt.nz/blog/how-does-nz%E2%80%99s-productivity-performance-stack-up</a:t>
-            </a:r>
-            <a:endParaRPr lang="en-NZ" dirty="0" smtClean="0"/>
+              <a:t>https://www.worktime.com/images/worktime-corporate-screenshot.png</a:t>
+            </a:r>
+            <a:endParaRPr lang="en-NZ" dirty="0"/>
           </a:p>
           <a:p>
             <a:endParaRPr lang="en-NZ" dirty="0"/>

</xml_diff>

<commit_message>
script and powerpoint updates
</commit_message>
<xml_diff>
--- a/Planning/Timekeeper.pptx
+++ b/Planning/Timekeeper.pptx
@@ -345,7 +345,7 @@
             <a:fld id="{5586B75A-687E-405C-8A0B-8D00578BA2C3}" type="datetimeFigureOut">
               <a:rPr lang="en-US" dirty="0"/>
               <a:pPr/>
-              <a:t>3/12/2017</a:t>
+              <a:t>3/13/2017</a:t>
             </a:fld>
             <a:endParaRPr lang="en-US" dirty="0"/>
           </a:p>
@@ -512,7 +512,7 @@
             <a:fld id="{5586B75A-687E-405C-8A0B-8D00578BA2C3}" type="datetimeFigureOut">
               <a:rPr lang="en-US" dirty="0"/>
               <a:pPr/>
-              <a:t>3/12/2017</a:t>
+              <a:t>3/13/2017</a:t>
             </a:fld>
             <a:endParaRPr lang="en-US" dirty="0"/>
           </a:p>
@@ -689,7 +689,7 @@
             <a:fld id="{5586B75A-687E-405C-8A0B-8D00578BA2C3}" type="datetimeFigureOut">
               <a:rPr lang="en-US" dirty="0"/>
               <a:pPr/>
-              <a:t>3/12/2017</a:t>
+              <a:t>3/13/2017</a:t>
             </a:fld>
             <a:endParaRPr lang="en-US" dirty="0"/>
           </a:p>
@@ -856,7 +856,7 @@
             <a:fld id="{5586B75A-687E-405C-8A0B-8D00578BA2C3}" type="datetimeFigureOut">
               <a:rPr lang="en-US" dirty="0"/>
               <a:pPr/>
-              <a:t>3/12/2017</a:t>
+              <a:t>3/13/2017</a:t>
             </a:fld>
             <a:endParaRPr lang="en-US" dirty="0"/>
           </a:p>
@@ -1111,7 +1111,7 @@
             <a:fld id="{5586B75A-687E-405C-8A0B-8D00578BA2C3}" type="datetimeFigureOut">
               <a:rPr lang="en-US" dirty="0"/>
               <a:pPr/>
-              <a:t>3/12/2017</a:t>
+              <a:t>3/13/2017</a:t>
             </a:fld>
             <a:endParaRPr lang="en-US" dirty="0"/>
           </a:p>
@@ -1396,7 +1396,7 @@
             <a:fld id="{5586B75A-687E-405C-8A0B-8D00578BA2C3}" type="datetimeFigureOut">
               <a:rPr lang="en-US" dirty="0"/>
               <a:pPr/>
-              <a:t>3/12/2017</a:t>
+              <a:t>3/13/2017</a:t>
             </a:fld>
             <a:endParaRPr lang="en-US" dirty="0"/>
           </a:p>
@@ -1835,7 +1835,7 @@
             <a:fld id="{5586B75A-687E-405C-8A0B-8D00578BA2C3}" type="datetimeFigureOut">
               <a:rPr lang="en-US" dirty="0"/>
               <a:pPr/>
-              <a:t>3/12/2017</a:t>
+              <a:t>3/13/2017</a:t>
             </a:fld>
             <a:endParaRPr lang="en-US" dirty="0"/>
           </a:p>
@@ -1950,7 +1950,7 @@
             <a:fld id="{5586B75A-687E-405C-8A0B-8D00578BA2C3}" type="datetimeFigureOut">
               <a:rPr lang="en-US" dirty="0"/>
               <a:pPr/>
-              <a:t>3/12/2017</a:t>
+              <a:t>3/13/2017</a:t>
             </a:fld>
             <a:endParaRPr lang="en-US" dirty="0"/>
           </a:p>
@@ -2042,7 +2042,7 @@
             <a:fld id="{5586B75A-687E-405C-8A0B-8D00578BA2C3}" type="datetimeFigureOut">
               <a:rPr lang="en-US" dirty="0"/>
               <a:pPr/>
-              <a:t>3/12/2017</a:t>
+              <a:t>3/13/2017</a:t>
             </a:fld>
             <a:endParaRPr lang="en-US" dirty="0"/>
           </a:p>
@@ -2327,7 +2327,7 @@
             <a:fld id="{5586B75A-687E-405C-8A0B-8D00578BA2C3}" type="datetimeFigureOut">
               <a:rPr lang="en-US" dirty="0"/>
               <a:pPr/>
-              <a:t>3/12/2017</a:t>
+              <a:t>3/13/2017</a:t>
             </a:fld>
             <a:endParaRPr lang="en-US" dirty="0"/>
           </a:p>
@@ -2597,7 +2597,7 @@
             <a:fld id="{5586B75A-687E-405C-8A0B-8D00578BA2C3}" type="datetimeFigureOut">
               <a:rPr lang="en-US" dirty="0"/>
               <a:pPr/>
-              <a:t>3/12/2017</a:t>
+              <a:t>3/13/2017</a:t>
             </a:fld>
             <a:endParaRPr lang="en-US" dirty="0"/>
           </a:p>
@@ -2891,7 +2891,7 @@
             <a:fld id="{5586B75A-687E-405C-8A0B-8D00578BA2C3}" type="datetimeFigureOut">
               <a:rPr lang="en-US" dirty="0"/>
               <a:pPr/>
-              <a:t>3/12/2017</a:t>
+              <a:t>3/13/2017</a:t>
             </a:fld>
             <a:endParaRPr lang="en-US" dirty="0"/>
           </a:p>
@@ -4262,7 +4262,6 @@
               <a:rPr lang="en-NZ" dirty="0"/>
               <a:t>More customisable for individual businesses</a:t>
             </a:r>
-            <a:endParaRPr lang="en-NZ" dirty="0"/>
           </a:p>
           <a:p>
             <a:r>
@@ -4385,14 +4384,24 @@
           </a:p>
           <a:p>
             <a:r>
+              <a:rPr lang="en-NZ" dirty="0" smtClean="0"/>
+              <a:t>Recurring </a:t>
+            </a:r>
+            <a:r>
               <a:rPr lang="en-NZ" dirty="0"/>
-              <a:t>Small to medium sized NZ companies that use computers</a:t>
+              <a:t>subscription based software as a service</a:t>
             </a:r>
           </a:p>
           <a:p>
             <a:r>
               <a:rPr lang="en-NZ" dirty="0"/>
-              <a:t>Particularly those lagging in the transition to digital technology</a:t>
+              <a:t>Optional installation fee</a:t>
+            </a:r>
+          </a:p>
+          <a:p>
+            <a:r>
+              <a:rPr lang="en-NZ" dirty="0"/>
+              <a:t>Relatively cheap to provide, only server maintenance and employee wages</a:t>
             </a:r>
           </a:p>
           <a:p>
@@ -4404,38 +4413,26 @@
           <a:p>
             <a:r>
               <a:rPr lang="en-NZ" dirty="0"/>
-              <a:t>Recurring subscription based software as a service</a:t>
-            </a:r>
-          </a:p>
-          <a:p>
-            <a:r>
-              <a:rPr lang="en-NZ" dirty="0"/>
-              <a:t>Optional installation fee</a:t>
-            </a:r>
-          </a:p>
-          <a:p>
-            <a:r>
-              <a:rPr lang="en-NZ" dirty="0"/>
-              <a:t>Relatively cheap to provide, only server maintenance and employee wages</a:t>
-            </a:r>
-          </a:p>
-          <a:p>
-            <a:pPr marL="0" indent="0">
-              <a:buNone/>
-            </a:pPr>
+              <a:t>Partner with companies that already provide software or web service to companies (i.e. </a:t>
+            </a:r>
+            <a:r>
+              <a:rPr lang="en-NZ" dirty="0" smtClean="0"/>
+              <a:t>Microsoft, Dell)</a:t>
+            </a:r>
             <a:endParaRPr lang="en-NZ" dirty="0"/>
           </a:p>
           <a:p>
             <a:r>
-              <a:rPr lang="en-NZ" dirty="0"/>
-              <a:t>Partner with companies that already provide software or web service to companies (i.e. Microsoft)</a:t>
-            </a:r>
-          </a:p>
-          <a:p>
-            <a:r>
-              <a:rPr lang="en-NZ" dirty="0"/>
-              <a:t>Some sort of package deal</a:t>
-            </a:r>
+              <a:rPr lang="en-NZ" dirty="0" smtClean="0"/>
+              <a:t>Preinstalled software</a:t>
+            </a:r>
+          </a:p>
+          <a:p>
+            <a:r>
+              <a:rPr lang="en-NZ" dirty="0" smtClean="0"/>
+              <a:t>Package deal</a:t>
+            </a:r>
+            <a:endParaRPr lang="en-NZ" dirty="0"/>
           </a:p>
           <a:p>
             <a:endParaRPr lang="en-NZ" dirty="0"/>
@@ -4500,6 +4497,10 @@
             <a:br>
               <a:rPr lang="en-NZ" dirty="0"/>
             </a:br>
+            <a:r>
+              <a:rPr lang="en-NZ" dirty="0"/>
+              <a:t/>
+            </a:r>
             <a:br>
               <a:rPr lang="en-NZ" dirty="0"/>
             </a:br>
@@ -4994,6 +4995,10 @@
             <a:br>
               <a:rPr lang="en-NZ" dirty="0"/>
             </a:br>
+            <a:r>
+              <a:rPr lang="en-NZ" dirty="0"/>
+              <a:t/>
+            </a:r>
             <a:br>
               <a:rPr lang="en-NZ" dirty="0"/>
             </a:br>

</xml_diff>

<commit_message>
updated script, powerpoint, Q/A
</commit_message>
<xml_diff>
--- a/Planning/Timekeeper.pptx
+++ b/Planning/Timekeeper.pptx
@@ -345,7 +345,7 @@
             <a:fld id="{5586B75A-687E-405C-8A0B-8D00578BA2C3}" type="datetimeFigureOut">
               <a:rPr lang="en-US" dirty="0"/>
               <a:pPr/>
-              <a:t>3/13/2017</a:t>
+              <a:t>3/15/2017</a:t>
             </a:fld>
             <a:endParaRPr lang="en-US" dirty="0"/>
           </a:p>
@@ -512,7 +512,7 @@
             <a:fld id="{5586B75A-687E-405C-8A0B-8D00578BA2C3}" type="datetimeFigureOut">
               <a:rPr lang="en-US" dirty="0"/>
               <a:pPr/>
-              <a:t>3/13/2017</a:t>
+              <a:t>3/15/2017</a:t>
             </a:fld>
             <a:endParaRPr lang="en-US" dirty="0"/>
           </a:p>
@@ -689,7 +689,7 @@
             <a:fld id="{5586B75A-687E-405C-8A0B-8D00578BA2C3}" type="datetimeFigureOut">
               <a:rPr lang="en-US" dirty="0"/>
               <a:pPr/>
-              <a:t>3/13/2017</a:t>
+              <a:t>3/15/2017</a:t>
             </a:fld>
             <a:endParaRPr lang="en-US" dirty="0"/>
           </a:p>
@@ -856,7 +856,7 @@
             <a:fld id="{5586B75A-687E-405C-8A0B-8D00578BA2C3}" type="datetimeFigureOut">
               <a:rPr lang="en-US" dirty="0"/>
               <a:pPr/>
-              <a:t>3/13/2017</a:t>
+              <a:t>3/15/2017</a:t>
             </a:fld>
             <a:endParaRPr lang="en-US" dirty="0"/>
           </a:p>
@@ -1111,7 +1111,7 @@
             <a:fld id="{5586B75A-687E-405C-8A0B-8D00578BA2C3}" type="datetimeFigureOut">
               <a:rPr lang="en-US" dirty="0"/>
               <a:pPr/>
-              <a:t>3/13/2017</a:t>
+              <a:t>3/15/2017</a:t>
             </a:fld>
             <a:endParaRPr lang="en-US" dirty="0"/>
           </a:p>
@@ -1396,7 +1396,7 @@
             <a:fld id="{5586B75A-687E-405C-8A0B-8D00578BA2C3}" type="datetimeFigureOut">
               <a:rPr lang="en-US" dirty="0"/>
               <a:pPr/>
-              <a:t>3/13/2017</a:t>
+              <a:t>3/15/2017</a:t>
             </a:fld>
             <a:endParaRPr lang="en-US" dirty="0"/>
           </a:p>
@@ -1835,7 +1835,7 @@
             <a:fld id="{5586B75A-687E-405C-8A0B-8D00578BA2C3}" type="datetimeFigureOut">
               <a:rPr lang="en-US" dirty="0"/>
               <a:pPr/>
-              <a:t>3/13/2017</a:t>
+              <a:t>3/15/2017</a:t>
             </a:fld>
             <a:endParaRPr lang="en-US" dirty="0"/>
           </a:p>
@@ -1950,7 +1950,7 @@
             <a:fld id="{5586B75A-687E-405C-8A0B-8D00578BA2C3}" type="datetimeFigureOut">
               <a:rPr lang="en-US" dirty="0"/>
               <a:pPr/>
-              <a:t>3/13/2017</a:t>
+              <a:t>3/15/2017</a:t>
             </a:fld>
             <a:endParaRPr lang="en-US" dirty="0"/>
           </a:p>
@@ -2042,7 +2042,7 @@
             <a:fld id="{5586B75A-687E-405C-8A0B-8D00578BA2C3}" type="datetimeFigureOut">
               <a:rPr lang="en-US" dirty="0"/>
               <a:pPr/>
-              <a:t>3/13/2017</a:t>
+              <a:t>3/15/2017</a:t>
             </a:fld>
             <a:endParaRPr lang="en-US" dirty="0"/>
           </a:p>
@@ -2327,7 +2327,7 @@
             <a:fld id="{5586B75A-687E-405C-8A0B-8D00578BA2C3}" type="datetimeFigureOut">
               <a:rPr lang="en-US" dirty="0"/>
               <a:pPr/>
-              <a:t>3/13/2017</a:t>
+              <a:t>3/15/2017</a:t>
             </a:fld>
             <a:endParaRPr lang="en-US" dirty="0"/>
           </a:p>
@@ -2597,7 +2597,7 @@
             <a:fld id="{5586B75A-687E-405C-8A0B-8D00578BA2C3}" type="datetimeFigureOut">
               <a:rPr lang="en-US" dirty="0"/>
               <a:pPr/>
-              <a:t>3/13/2017</a:t>
+              <a:t>3/15/2017</a:t>
             </a:fld>
             <a:endParaRPr lang="en-US" dirty="0"/>
           </a:p>
@@ -2891,7 +2891,7 @@
             <a:fld id="{5586B75A-687E-405C-8A0B-8D00578BA2C3}" type="datetimeFigureOut">
               <a:rPr lang="en-US" dirty="0"/>
               <a:pPr/>
-              <a:t>3/13/2017</a:t>
+              <a:t>3/15/2017</a:t>
             </a:fld>
             <a:endParaRPr lang="en-US" dirty="0"/>
           </a:p>
@@ -4047,7 +4047,12 @@
             <p:ph idx="1"/>
           </p:nvPr>
         </p:nvSpPr>
-        <p:spPr/>
+        <p:spPr>
+          <a:xfrm>
+            <a:off x="3869268" y="604379"/>
+            <a:ext cx="7315200" cy="5120640"/>
+          </a:xfrm>
+        </p:spPr>
         <p:txBody>
           <a:bodyPr/>
           <a:lstStyle/>
@@ -4097,7 +4102,10 @@
             </a:r>
           </a:p>
           <a:p>
-            <a:endParaRPr lang="en-NZ" dirty="0"/>
+            <a:r>
+              <a:rPr lang="en-NZ" dirty="0"/>
+              <a:t>Suggests improvements to workplace for supervisors</a:t>
+            </a:r>
           </a:p>
           <a:p>
             <a:endParaRPr lang="en-NZ" dirty="0"/>
@@ -4130,7 +4138,7 @@
         </p:blipFill>
         <p:spPr bwMode="auto">
           <a:xfrm>
-            <a:off x="6640122" y="4571138"/>
+            <a:off x="6614956" y="4644561"/>
             <a:ext cx="2102225" cy="2160917"/>
           </a:xfrm>
           <a:prstGeom prst="rect">
@@ -4384,12 +4392,8 @@
           </a:p>
           <a:p>
             <a:r>
-              <a:rPr lang="en-NZ" dirty="0" smtClean="0"/>
-              <a:t>Recurring </a:t>
-            </a:r>
-            <a:r>
               <a:rPr lang="en-NZ" dirty="0"/>
-              <a:t>subscription based software as a service</a:t>
+              <a:t>Recurring subscription based software as a service</a:t>
             </a:r>
           </a:p>
           <a:p>
@@ -4413,26 +4417,20 @@
           <a:p>
             <a:r>
               <a:rPr lang="en-NZ" dirty="0"/>
-              <a:t>Partner with companies that already provide software or web service to companies (i.e. </a:t>
-            </a:r>
-            <a:r>
-              <a:rPr lang="en-NZ" dirty="0" smtClean="0"/>
-              <a:t>Microsoft, Dell)</a:t>
-            </a:r>
-            <a:endParaRPr lang="en-NZ" dirty="0"/>
-          </a:p>
-          <a:p>
-            <a:r>
-              <a:rPr lang="en-NZ" dirty="0" smtClean="0"/>
+              <a:t>Partner with companies that already provide software or web service to companies (i.e. Microsoft, Dell)</a:t>
+            </a:r>
+          </a:p>
+          <a:p>
+            <a:r>
+              <a:rPr lang="en-NZ" dirty="0"/>
               <a:t>Preinstalled software</a:t>
             </a:r>
           </a:p>
           <a:p>
             <a:r>
-              <a:rPr lang="en-NZ" dirty="0" smtClean="0"/>
+              <a:rPr lang="en-NZ" dirty="0"/>
               <a:t>Package deal</a:t>
             </a:r>
-            <a:endParaRPr lang="en-NZ" dirty="0"/>
           </a:p>
           <a:p>
             <a:endParaRPr lang="en-NZ" dirty="0"/>
@@ -4497,10 +4495,6 @@
             <a:br>
               <a:rPr lang="en-NZ" dirty="0"/>
             </a:br>
-            <a:r>
-              <a:rPr lang="en-NZ" dirty="0"/>
-              <a:t/>
-            </a:r>
             <a:br>
               <a:rPr lang="en-NZ" dirty="0"/>
             </a:br>
@@ -4995,10 +4989,6 @@
             <a:br>
               <a:rPr lang="en-NZ" dirty="0"/>
             </a:br>
-            <a:r>
-              <a:rPr lang="en-NZ" dirty="0"/>
-              <a:t/>
-            </a:r>
             <a:br>
               <a:rPr lang="en-NZ" dirty="0"/>
             </a:br>

</xml_diff>